<commit_message>
add template to ppt presentation
</commit_message>
<xml_diff>
--- a/presentations/pm_recalc_NCEE_brownbag.pptx
+++ b/presentations/pm_recalc_NCEE_brownbag.pptx
@@ -1,27 +1,26 @@
 
 <file path=ppt/presentation.xml><?xml version="1.0" encoding="utf-8"?>
-<p:presentation xmlns:a="http://schemas.openxmlformats.org/drawingml/2006/main" xmlns:p="http://schemas.openxmlformats.org/presentationml/2006/main" xmlns:r="http://schemas.openxmlformats.org/officeDocument/2006/relationships" autoCompressPictures="0" saveSubsetFonts="1">
+<p:presentation xmlns:a="http://schemas.openxmlformats.org/drawingml/2006/main" xmlns:p="http://schemas.openxmlformats.org/presentationml/2006/main" xmlns:r="http://schemas.openxmlformats.org/officeDocument/2006/relationships" saveSubsetFonts="1">
   <p:sldMasterIdLst>
-    <p:sldMasterId id="2147483648" r:id="rId1"/>
+    <p:sldMasterId id="2147483648" r:id="rId5"/>
   </p:sldMasterIdLst>
   <p:sldIdLst>
-    <p:sldId id="256" r:id="rId2"/>
-    <p:sldId id="257" r:id="rId3"/>
-    <p:sldId id="258" r:id="rId4"/>
-    <p:sldId id="259" r:id="rId5"/>
-    <p:sldId id="260" r:id="rId6"/>
-    <p:sldId id="261" r:id="rId7"/>
-    <p:sldId id="262" r:id="rId8"/>
-    <p:sldId id="263" r:id="rId9"/>
-    <p:sldId id="264" r:id="rId10"/>
+    <p:sldId id="256" r:id="rId6"/>
+    <p:sldId id="257" r:id="rId7"/>
+    <p:sldId id="258" r:id="rId8"/>
+    <p:sldId id="259" r:id="rId9"/>
+    <p:sldId id="260" r:id="rId10"/>
+    <p:sldId id="261" r:id="rId11"/>
+    <p:sldId id="262" r:id="rId12"/>
+    <p:sldId id="263" r:id="rId13"/>
   </p:sldIdLst>
-  <p:sldSz cx="9144000" cy="5143500" type="screen16x9"/>
+  <p:sldSz cx="12192000" cy="6858000"/>
   <p:notesSz cx="6858000" cy="9144000"/>
   <p:defaultTextStyle>
     <a:defPPr>
       <a:defRPr lang="en-US"/>
     </a:defPPr>
-    <a:lvl1pPr algn="l" defTabSz="457200" eaLnBrk="1" hangingPunct="1" latinLnBrk="0" marL="0" rtl="0">
+    <a:lvl1pPr algn="l" defTabSz="914400" eaLnBrk="1" hangingPunct="1" latinLnBrk="0" marL="0" rtl="0">
       <a:defRPr kern="1200" sz="1800">
         <a:solidFill>
           <a:schemeClr val="tx1"/>
@@ -31,7 +30,7 @@
         <a:cs typeface="+mn-cs"/>
       </a:defRPr>
     </a:lvl1pPr>
-    <a:lvl2pPr algn="l" defTabSz="457200" eaLnBrk="1" hangingPunct="1" latinLnBrk="0" marL="457200" rtl="0">
+    <a:lvl2pPr algn="l" defTabSz="914400" eaLnBrk="1" hangingPunct="1" latinLnBrk="0" marL="457200" rtl="0">
       <a:defRPr kern="1200" sz="1800">
         <a:solidFill>
           <a:schemeClr val="tx1"/>
@@ -41,7 +40,7 @@
         <a:cs typeface="+mn-cs"/>
       </a:defRPr>
     </a:lvl2pPr>
-    <a:lvl3pPr algn="l" defTabSz="457200" eaLnBrk="1" hangingPunct="1" latinLnBrk="0" marL="914400" rtl="0">
+    <a:lvl3pPr algn="l" defTabSz="914400" eaLnBrk="1" hangingPunct="1" latinLnBrk="0" marL="914400" rtl="0">
       <a:defRPr kern="1200" sz="1800">
         <a:solidFill>
           <a:schemeClr val="tx1"/>
@@ -51,7 +50,7 @@
         <a:cs typeface="+mn-cs"/>
       </a:defRPr>
     </a:lvl3pPr>
-    <a:lvl4pPr algn="l" defTabSz="457200" eaLnBrk="1" hangingPunct="1" latinLnBrk="0" marL="1371600" rtl="0">
+    <a:lvl4pPr algn="l" defTabSz="914400" eaLnBrk="1" hangingPunct="1" latinLnBrk="0" marL="1371600" rtl="0">
       <a:defRPr kern="1200" sz="1800">
         <a:solidFill>
           <a:schemeClr val="tx1"/>
@@ -61,7 +60,7 @@
         <a:cs typeface="+mn-cs"/>
       </a:defRPr>
     </a:lvl4pPr>
-    <a:lvl5pPr algn="l" defTabSz="457200" eaLnBrk="1" hangingPunct="1" latinLnBrk="0" marL="1828800" rtl="0">
+    <a:lvl5pPr algn="l" defTabSz="914400" eaLnBrk="1" hangingPunct="1" latinLnBrk="0" marL="1828800" rtl="0">
       <a:defRPr kern="1200" sz="1800">
         <a:solidFill>
           <a:schemeClr val="tx1"/>
@@ -71,7 +70,7 @@
         <a:cs typeface="+mn-cs"/>
       </a:defRPr>
     </a:lvl5pPr>
-    <a:lvl6pPr algn="l" defTabSz="457200" eaLnBrk="1" hangingPunct="1" latinLnBrk="0" marL="2286000" rtl="0">
+    <a:lvl6pPr algn="l" defTabSz="914400" eaLnBrk="1" hangingPunct="1" latinLnBrk="0" marL="2286000" rtl="0">
       <a:defRPr kern="1200" sz="1800">
         <a:solidFill>
           <a:schemeClr val="tx1"/>
@@ -81,7 +80,7 @@
         <a:cs typeface="+mn-cs"/>
       </a:defRPr>
     </a:lvl6pPr>
-    <a:lvl7pPr algn="l" defTabSz="457200" eaLnBrk="1" hangingPunct="1" latinLnBrk="0" marL="2743200" rtl="0">
+    <a:lvl7pPr algn="l" defTabSz="914400" eaLnBrk="1" hangingPunct="1" latinLnBrk="0" marL="2743200" rtl="0">
       <a:defRPr kern="1200" sz="1800">
         <a:solidFill>
           <a:schemeClr val="tx1"/>
@@ -91,7 +90,7 @@
         <a:cs typeface="+mn-cs"/>
       </a:defRPr>
     </a:lvl7pPr>
-    <a:lvl8pPr algn="l" defTabSz="457200" eaLnBrk="1" hangingPunct="1" latinLnBrk="0" marL="3200400" rtl="0">
+    <a:lvl8pPr algn="l" defTabSz="914400" eaLnBrk="1" hangingPunct="1" latinLnBrk="0" marL="3200400" rtl="0">
       <a:defRPr kern="1200" sz="1800">
         <a:solidFill>
           <a:schemeClr val="tx1"/>
@@ -101,7 +100,7 @@
         <a:cs typeface="+mn-cs"/>
       </a:defRPr>
     </a:lvl8pPr>
-    <a:lvl9pPr algn="l" defTabSz="457200" eaLnBrk="1" hangingPunct="1" latinLnBrk="0" marL="3657600" rtl="0">
+    <a:lvl9pPr algn="l" defTabSz="914400" eaLnBrk="1" hangingPunct="1" latinLnBrk="0" marL="3657600" rtl="0">
       <a:defRPr kern="1200" sz="1800">
         <a:solidFill>
           <a:schemeClr val="tx1"/>
@@ -114,18 +113,7 @@
   </p:defaultTextStyle>
   <p:extLst>
     <p:ext uri="{EFAFB233-063F-42B5-8137-9DF3F51BA10A}">
-      <p15:sldGuideLst xmlns:p15="http://schemas.microsoft.com/office/powerpoint/2012/main">
-        <p15:guide id="1" orient="horz" pos="1620" userDrawn="1">
-          <p15:clr>
-            <a:srgbClr val="A4A3A4"/>
-          </p15:clr>
-        </p15:guide>
-        <p15:guide id="2" pos="2880" userDrawn="1">
-          <p15:clr>
-            <a:srgbClr val="A4A3A4"/>
-          </p15:clr>
-        </p15:guide>
-      </p15:sldGuideLst>
+      <p15:sldGuideLst xmlns:p15="http://schemas.microsoft.com/office/powerpoint/2012/main"/>
     </p:ext>
   </p:extLst>
 </p:presentation>
@@ -160,13 +148,17 @@
         </p:nvSpPr>
         <p:spPr>
           <a:xfrm>
-            <a:off x="685800" y="1597819"/>
-            <a:ext cx="7772400" cy="1102519"/>
+            <a:off x="1524000" y="1470991"/>
+            <a:ext cx="9144000" cy="2038972"/>
           </a:xfrm>
         </p:spPr>
         <p:txBody>
-          <a:bodyPr/>
-          <a:lstStyle/>
+          <a:bodyPr anchor="b"/>
+          <a:lstStyle>
+            <a:lvl1pPr algn="ctr">
+              <a:defRPr sz="6000"/>
+            </a:lvl1pPr>
+          </a:lstStyle>
           <a:p>
             <a:r>
               <a:rPr lang="en-US"/>
@@ -187,8 +179,8 @@
         </p:nvSpPr>
         <p:spPr>
           <a:xfrm>
-            <a:off x="1371600" y="2914650"/>
-            <a:ext cx="6400800" cy="1314450"/>
+            <a:off x="1524000" y="3602038"/>
+            <a:ext cx="9144000" cy="1655762"/>
           </a:xfrm>
         </p:spPr>
         <p:txBody>
@@ -196,93 +188,39 @@
           <a:lstStyle>
             <a:lvl1pPr marL="0" indent="0" algn="ctr">
               <a:buNone/>
-              <a:defRPr>
-                <a:solidFill>
-                  <a:schemeClr val="tx1">
-                    <a:tint val="75000"/>
-                  </a:schemeClr>
-                </a:solidFill>
-              </a:defRPr>
+              <a:defRPr sz="2400"/>
             </a:lvl1pPr>
-            <a:lvl2pPr marL="342900" indent="0" algn="ctr">
-              <a:buNone/>
-              <a:defRPr>
-                <a:solidFill>
-                  <a:schemeClr val="tx1">
-                    <a:tint val="75000"/>
-                  </a:schemeClr>
-                </a:solidFill>
-              </a:defRPr>
+            <a:lvl2pPr marL="457200" indent="0" algn="ctr">
+              <a:buNone/>
+              <a:defRPr sz="2000"/>
             </a:lvl2pPr>
-            <a:lvl3pPr marL="685800" indent="0" algn="ctr">
-              <a:buNone/>
-              <a:defRPr>
-                <a:solidFill>
-                  <a:schemeClr val="tx1">
-                    <a:tint val="75000"/>
-                  </a:schemeClr>
-                </a:solidFill>
-              </a:defRPr>
+            <a:lvl3pPr marL="914400" indent="0" algn="ctr">
+              <a:buNone/>
+              <a:defRPr sz="1800"/>
             </a:lvl3pPr>
-            <a:lvl4pPr marL="1028700" indent="0" algn="ctr">
-              <a:buNone/>
-              <a:defRPr>
-                <a:solidFill>
-                  <a:schemeClr val="tx1">
-                    <a:tint val="75000"/>
-                  </a:schemeClr>
-                </a:solidFill>
-              </a:defRPr>
+            <a:lvl4pPr marL="1371600" indent="0" algn="ctr">
+              <a:buNone/>
+              <a:defRPr sz="1600"/>
             </a:lvl4pPr>
-            <a:lvl5pPr marL="1371600" indent="0" algn="ctr">
-              <a:buNone/>
-              <a:defRPr>
-                <a:solidFill>
-                  <a:schemeClr val="tx1">
-                    <a:tint val="75000"/>
-                  </a:schemeClr>
-                </a:solidFill>
-              </a:defRPr>
+            <a:lvl5pPr marL="1828800" indent="0" algn="ctr">
+              <a:buNone/>
+              <a:defRPr sz="1600"/>
             </a:lvl5pPr>
-            <a:lvl6pPr marL="1714500" indent="0" algn="ctr">
-              <a:buNone/>
-              <a:defRPr>
-                <a:solidFill>
-                  <a:schemeClr val="tx1">
-                    <a:tint val="75000"/>
-                  </a:schemeClr>
-                </a:solidFill>
-              </a:defRPr>
+            <a:lvl6pPr marL="2286000" indent="0" algn="ctr">
+              <a:buNone/>
+              <a:defRPr sz="1600"/>
             </a:lvl6pPr>
-            <a:lvl7pPr marL="2057400" indent="0" algn="ctr">
-              <a:buNone/>
-              <a:defRPr>
-                <a:solidFill>
-                  <a:schemeClr val="tx1">
-                    <a:tint val="75000"/>
-                  </a:schemeClr>
-                </a:solidFill>
-              </a:defRPr>
+            <a:lvl7pPr marL="2743200" indent="0" algn="ctr">
+              <a:buNone/>
+              <a:defRPr sz="1600"/>
             </a:lvl7pPr>
-            <a:lvl8pPr marL="2400300" indent="0" algn="ctr">
-              <a:buNone/>
-              <a:defRPr>
-                <a:solidFill>
-                  <a:schemeClr val="tx1">
-                    <a:tint val="75000"/>
-                  </a:schemeClr>
-                </a:solidFill>
-              </a:defRPr>
+            <a:lvl8pPr marL="3200400" indent="0" algn="ctr">
+              <a:buNone/>
+              <a:defRPr sz="1600"/>
             </a:lvl8pPr>
-            <a:lvl9pPr marL="2743200" indent="0" algn="ctr">
-              <a:buNone/>
-              <a:defRPr>
-                <a:solidFill>
-                  <a:schemeClr val="tx1">
-                    <a:tint val="75000"/>
-                  </a:schemeClr>
-                </a:solidFill>
-              </a:defRPr>
+            <a:lvl9pPr marL="3657600" indent="0" algn="ctr">
+              <a:buNone/>
+              <a:defRPr sz="1600"/>
             </a:lvl9pPr>
           </a:lstStyle>
           <a:p>
@@ -308,9 +246,9 @@
           <a:bodyPr/>
           <a:lstStyle/>
           <a:p>
-            <a:fld id="{241EB5C9-1307-BA42-ABA2-0BC069CD8E7F}" type="datetimeFigureOut">
+            <a:fld id="{2ED845B3-3DF6-4317-9DB0-04F5F3CC988F}" type="datetimeFigureOut">
               <a:rPr lang="en-US" smtClean="0"/>
-              <a:t>1/2/22</a:t>
+              <a:t>10/24/2024</a:t>
             </a:fld>
             <a:endParaRPr lang="en-US"/>
           </a:p>
@@ -350,7 +288,7 @@
           <a:bodyPr/>
           <a:lstStyle/>
           <a:p>
-            <a:fld id="{C5EF2332-01BF-834F-8236-50238282D533}" type="slidenum">
+            <a:fld id="{B1ACB710-0265-4668-9FC1-C9C0EDA73F24}" type="slidenum">
               <a:rPr lang="en-US" smtClean="0"/>
               <a:t>‹#›</a:t>
             </a:fld>
@@ -361,13 +299,39 @@
     </p:spTree>
     <p:extLst>
       <p:ext uri="{BB962C8B-B14F-4D97-AF65-F5344CB8AC3E}">
-        <p14:creationId xmlns:p14="http://schemas.microsoft.com/office/powerpoint/2010/main" val="1444357513"/>
+        <p14:creationId xmlns:p14="http://schemas.microsoft.com/office/powerpoint/2010/main" val="171102578"/>
       </p:ext>
     </p:extLst>
   </p:cSld>
   <p:clrMapOvr>
     <a:masterClrMapping/>
   </p:clrMapOvr>
+  <p:extLst>
+    <p:ext uri="{DCECCB84-F9BA-43D5-87BE-67443E8EF086}">
+      <p15:sldGuideLst xmlns:p15="http://schemas.microsoft.com/office/powerpoint/2012/main">
+        <p15:guide id="1" orient="horz" pos="205" userDrawn="1">
+          <p15:clr>
+            <a:srgbClr val="FBAE40"/>
+          </p15:clr>
+        </p15:guide>
+        <p15:guide id="2" pos="1272" userDrawn="1">
+          <p15:clr>
+            <a:srgbClr val="FBAE40"/>
+          </p15:clr>
+        </p15:guide>
+        <p15:guide id="3" orient="horz" pos="781" userDrawn="1">
+          <p15:clr>
+            <a:srgbClr val="FBAE40"/>
+          </p15:clr>
+        </p15:guide>
+        <p15:guide id="4" pos="1944" userDrawn="1">
+          <p15:clr>
+            <a:srgbClr val="FBAE40"/>
+          </p15:clr>
+        </p15:guide>
+      </p15:sldGuideLst>
+    </p:ext>
+  </p:extLst>
 </p:sldLayout>
 </file>
 
@@ -736,6 +700,110 @@
       </p:grpSpPr>
       <p:sp>
         <p:nvSpPr>
+          <p:cNvPr id="7" name="Freeform 6"/>
+          <p:cNvSpPr/>
+          <p:nvPr userDrawn="1"/>
+        </p:nvSpPr>
+        <p:spPr>
+          <a:xfrm>
+            <a:off x="2242196" y="337167"/>
+            <a:ext cx="9959248" cy="914400"/>
+          </a:xfrm>
+          <a:custGeom>
+            <a:avLst/>
+            <a:gdLst>
+              <a:gd name="connsiteX0" fmla="*/ 9959248 w 9959248"/>
+              <a:gd name="connsiteY0" fmla="*/ 0 h 914400"/>
+              <a:gd name="connsiteX1" fmla="*/ 0 w 9959248"/>
+              <a:gd name="connsiteY1" fmla="*/ 0 h 914400"/>
+              <a:gd name="connsiteX2" fmla="*/ 914400 w 9959248"/>
+              <a:gd name="connsiteY2" fmla="*/ 914400 h 914400"/>
+              <a:gd name="connsiteX3" fmla="*/ 9959248 w 9959248"/>
+              <a:gd name="connsiteY3" fmla="*/ 914400 h 914400"/>
+              <a:gd name="connsiteX4" fmla="*/ 9959248 w 9959248"/>
+              <a:gd name="connsiteY4" fmla="*/ 0 h 914400"/>
+            </a:gdLst>
+            <a:ahLst/>
+            <a:cxnLst>
+              <a:cxn ang="0">
+                <a:pos x="connsiteX0" y="connsiteY0"/>
+              </a:cxn>
+              <a:cxn ang="0">
+                <a:pos x="connsiteX1" y="connsiteY1"/>
+              </a:cxn>
+              <a:cxn ang="0">
+                <a:pos x="connsiteX2" y="connsiteY2"/>
+              </a:cxn>
+              <a:cxn ang="0">
+                <a:pos x="connsiteX3" y="connsiteY3"/>
+              </a:cxn>
+              <a:cxn ang="0">
+                <a:pos x="connsiteX4" y="connsiteY4"/>
+              </a:cxn>
+            </a:cxnLst>
+            <a:rect l="l" t="t" r="r" b="b"/>
+            <a:pathLst>
+              <a:path w="9959248" h="914400">
+                <a:moveTo>
+                  <a:pt x="9959248" y="0"/>
+                </a:moveTo>
+                <a:lnTo>
+                  <a:pt x="0" y="0"/>
+                </a:lnTo>
+                <a:lnTo>
+                  <a:pt x="914400" y="914400"/>
+                </a:lnTo>
+                <a:lnTo>
+                  <a:pt x="9959248" y="914400"/>
+                </a:lnTo>
+                <a:lnTo>
+                  <a:pt x="9959248" y="0"/>
+                </a:lnTo>
+                <a:close/>
+              </a:path>
+            </a:pathLst>
+          </a:custGeom>
+          <a:solidFill>
+            <a:schemeClr val="bg1"/>
+          </a:solidFill>
+          <a:ln>
+            <a:noFill/>
+          </a:ln>
+          <a:effectLst>
+            <a:outerShdw blurRad="127000" dist="63500" dir="1800000" algn="tl" rotWithShape="0">
+              <a:prstClr val="black">
+                <a:alpha val="40000"/>
+              </a:prstClr>
+            </a:outerShdw>
+          </a:effectLst>
+        </p:spPr>
+        <p:style>
+          <a:lnRef idx="2">
+            <a:schemeClr val="accent1">
+              <a:shade val="50000"/>
+            </a:schemeClr>
+          </a:lnRef>
+          <a:fillRef idx="1">
+            <a:schemeClr val="accent1"/>
+          </a:fillRef>
+          <a:effectRef idx="0">
+            <a:schemeClr val="accent1"/>
+          </a:effectRef>
+          <a:fontRef idx="minor">
+            <a:schemeClr val="lt1"/>
+          </a:fontRef>
+        </p:style>
+        <p:txBody>
+          <a:bodyPr rtlCol="0" anchor="ctr"/>
+          <a:lstStyle/>
+          <a:p>
+            <a:pPr algn="ctr"/>
+            <a:endParaRPr lang="en-US"/>
+          </a:p>
+        </p:txBody>
+      </p:sp>
+      <p:sp>
+        <p:nvSpPr>
           <p:cNvPr id="2" name="Title 1"/>
           <p:cNvSpPr>
             <a:spLocks noGrp="1"/>
@@ -822,9 +890,9 @@
           <a:bodyPr/>
           <a:lstStyle/>
           <a:p>
-            <a:fld id="{241EB5C9-1307-BA42-ABA2-0BC069CD8E7F}" type="datetimeFigureOut">
+            <a:fld id="{2ED845B3-3DF6-4317-9DB0-04F5F3CC988F}" type="datetimeFigureOut">
               <a:rPr lang="en-US" smtClean="0"/>
-              <a:t>1/2/22</a:t>
+              <a:t>10/24/2024</a:t>
             </a:fld>
             <a:endParaRPr lang="en-US"/>
           </a:p>
@@ -864,7 +932,7 @@
           <a:bodyPr/>
           <a:lstStyle/>
           <a:p>
-            <a:fld id="{C5EF2332-01BF-834F-8236-50238282D533}" type="slidenum">
+            <a:fld id="{B1ACB710-0265-4668-9FC1-C9C0EDA73F24}" type="slidenum">
               <a:rPr lang="en-US" smtClean="0"/>
               <a:t>‹#›</a:t>
             </a:fld>
@@ -875,7 +943,7 @@
     </p:spTree>
     <p:extLst>
       <p:ext uri="{BB962C8B-B14F-4D97-AF65-F5344CB8AC3E}">
-        <p14:creationId xmlns:p14="http://schemas.microsoft.com/office/powerpoint/2010/main" val="338346009"/>
+        <p14:creationId xmlns:p14="http://schemas.microsoft.com/office/powerpoint/2010/main" val="800614690"/>
       </p:ext>
     </p:extLst>
   </p:cSld>
@@ -914,15 +982,15 @@
         </p:nvSpPr>
         <p:spPr>
           <a:xfrm>
-            <a:off x="722313" y="3305176"/>
-            <a:ext cx="7772400" cy="1021556"/>
+            <a:off x="831850" y="1709738"/>
+            <a:ext cx="10515600" cy="2852737"/>
           </a:xfrm>
         </p:spPr>
         <p:txBody>
-          <a:bodyPr anchor="t"/>
+          <a:bodyPr anchor="b"/>
           <a:lstStyle>
-            <a:lvl1pPr algn="l">
-              <a:defRPr sz="3000" b="1" cap="all"/>
+            <a:lvl1pPr>
+              <a:defRPr sz="6000"/>
             </a:lvl1pPr>
           </a:lstStyle>
           <a:p>
@@ -945,16 +1013,16 @@
         </p:nvSpPr>
         <p:spPr>
           <a:xfrm>
-            <a:off x="722313" y="2180035"/>
-            <a:ext cx="7772400" cy="1125140"/>
+            <a:off x="831850" y="4589463"/>
+            <a:ext cx="10515600" cy="1500187"/>
           </a:xfrm>
         </p:spPr>
         <p:txBody>
-          <a:bodyPr anchor="b"/>
+          <a:bodyPr/>
           <a:lstStyle>
             <a:lvl1pPr marL="0" indent="0">
               <a:buNone/>
-              <a:defRPr sz="1500">
+              <a:defRPr sz="2400">
                 <a:solidFill>
                   <a:schemeClr val="tx1">
                     <a:tint val="75000"/>
@@ -962,9 +1030,9 @@
                 </a:solidFill>
               </a:defRPr>
             </a:lvl1pPr>
-            <a:lvl2pPr marL="342900" indent="0">
-              <a:buNone/>
-              <a:defRPr sz="1350">
+            <a:lvl2pPr marL="457200" indent="0">
+              <a:buNone/>
+              <a:defRPr sz="2000">
                 <a:solidFill>
                   <a:schemeClr val="tx1">
                     <a:tint val="75000"/>
@@ -972,9 +1040,9 @@
                 </a:solidFill>
               </a:defRPr>
             </a:lvl2pPr>
-            <a:lvl3pPr marL="685800" indent="0">
-              <a:buNone/>
-              <a:defRPr sz="1200">
+            <a:lvl3pPr marL="914400" indent="0">
+              <a:buNone/>
+              <a:defRPr sz="1800">
                 <a:solidFill>
                   <a:schemeClr val="tx1">
                     <a:tint val="75000"/>
@@ -982,9 +1050,9 @@
                 </a:solidFill>
               </a:defRPr>
             </a:lvl3pPr>
-            <a:lvl4pPr marL="1028700" indent="0">
-              <a:buNone/>
-              <a:defRPr sz="1050">
+            <a:lvl4pPr marL="1371600" indent="0">
+              <a:buNone/>
+              <a:defRPr sz="1600">
                 <a:solidFill>
                   <a:schemeClr val="tx1">
                     <a:tint val="75000"/>
@@ -992,9 +1060,9 @@
                 </a:solidFill>
               </a:defRPr>
             </a:lvl4pPr>
-            <a:lvl5pPr marL="1371600" indent="0">
-              <a:buNone/>
-              <a:defRPr sz="1050">
+            <a:lvl5pPr marL="1828800" indent="0">
+              <a:buNone/>
+              <a:defRPr sz="1600">
                 <a:solidFill>
                   <a:schemeClr val="tx1">
                     <a:tint val="75000"/>
@@ -1002,9 +1070,9 @@
                 </a:solidFill>
               </a:defRPr>
             </a:lvl5pPr>
-            <a:lvl6pPr marL="1714500" indent="0">
-              <a:buNone/>
-              <a:defRPr sz="1050">
+            <a:lvl6pPr marL="2286000" indent="0">
+              <a:buNone/>
+              <a:defRPr sz="1600">
                 <a:solidFill>
                   <a:schemeClr val="tx1">
                     <a:tint val="75000"/>
@@ -1012,9 +1080,9 @@
                 </a:solidFill>
               </a:defRPr>
             </a:lvl6pPr>
-            <a:lvl7pPr marL="2057400" indent="0">
-              <a:buNone/>
-              <a:defRPr sz="1050">
+            <a:lvl7pPr marL="2743200" indent="0">
+              <a:buNone/>
+              <a:defRPr sz="1600">
                 <a:solidFill>
                   <a:schemeClr val="tx1">
                     <a:tint val="75000"/>
@@ -1022,9 +1090,9 @@
                 </a:solidFill>
               </a:defRPr>
             </a:lvl7pPr>
-            <a:lvl8pPr marL="2400300" indent="0">
-              <a:buNone/>
-              <a:defRPr sz="1050">
+            <a:lvl8pPr marL="3200400" indent="0">
+              <a:buNone/>
+              <a:defRPr sz="1600">
                 <a:solidFill>
                   <a:schemeClr val="tx1">
                     <a:tint val="75000"/>
@@ -1032,9 +1100,9 @@
                 </a:solidFill>
               </a:defRPr>
             </a:lvl8pPr>
-            <a:lvl9pPr marL="2743200" indent="0">
-              <a:buNone/>
-              <a:defRPr sz="1050">
+            <a:lvl9pPr marL="3657600" indent="0">
+              <a:buNone/>
+              <a:defRPr sz="1600">
                 <a:solidFill>
                   <a:schemeClr val="tx1">
                     <a:tint val="75000"/>
@@ -1067,9 +1135,9 @@
           <a:bodyPr/>
           <a:lstStyle/>
           <a:p>
-            <a:fld id="{241EB5C9-1307-BA42-ABA2-0BC069CD8E7F}" type="datetimeFigureOut">
+            <a:fld id="{2ED845B3-3DF6-4317-9DB0-04F5F3CC988F}" type="datetimeFigureOut">
               <a:rPr lang="en-US" smtClean="0"/>
-              <a:t>1/2/22</a:t>
+              <a:t>10/24/2024</a:t>
             </a:fld>
             <a:endParaRPr lang="en-US"/>
           </a:p>
@@ -1109,7 +1177,7 @@
           <a:bodyPr/>
           <a:lstStyle/>
           <a:p>
-            <a:fld id="{C5EF2332-01BF-834F-8236-50238282D533}" type="slidenum">
+            <a:fld id="{B1ACB710-0265-4668-9FC1-C9C0EDA73F24}" type="slidenum">
               <a:rPr lang="en-US" smtClean="0"/>
               <a:t>‹#›</a:t>
             </a:fld>
@@ -1120,7 +1188,7 @@
     </p:spTree>
     <p:extLst>
       <p:ext uri="{BB962C8B-B14F-4D97-AF65-F5344CB8AC3E}">
-        <p14:creationId xmlns:p14="http://schemas.microsoft.com/office/powerpoint/2010/main" val="1073069076"/>
+        <p14:creationId xmlns:p14="http://schemas.microsoft.com/office/powerpoint/2010/main" val="1259137228"/>
       </p:ext>
     </p:extLst>
   </p:cSld>
@@ -1149,73 +1217,149 @@
       </p:grpSpPr>
       <p:sp>
         <p:nvSpPr>
-          <p:cNvPr id="2" name="Title 1"/>
-          <p:cNvSpPr>
-            <a:spLocks noGrp="1"/>
-          </p:cNvSpPr>
-          <p:nvPr>
-            <p:ph type="title"/>
-          </p:nvPr>
-        </p:nvSpPr>
-        <p:spPr/>
-        <p:txBody>
-          <a:bodyPr/>
-          <a:lstStyle/>
-          <a:p>
-            <a:r>
-              <a:rPr lang="en-US"/>
-              <a:t>Click to edit Master title style</a:t>
-            </a:r>
-          </a:p>
-        </p:txBody>
-      </p:sp>
-      <p:sp>
-        <p:nvSpPr>
-          <p:cNvPr id="3" name="Content Placeholder 2"/>
-          <p:cNvSpPr>
-            <a:spLocks noGrp="1"/>
-          </p:cNvSpPr>
-          <p:nvPr>
-            <p:ph sz="half" idx="1"/>
-          </p:nvPr>
+          <p:cNvPr id="8" name="Freeform 7"/>
+          <p:cNvSpPr/>
+          <p:nvPr userDrawn="1"/>
         </p:nvSpPr>
         <p:spPr>
           <a:xfrm>
-            <a:off x="457200" y="1200151"/>
-            <a:ext cx="4038600" cy="3394472"/>
+            <a:off x="2242196" y="337167"/>
+            <a:ext cx="9959248" cy="914400"/>
+          </a:xfrm>
+          <a:custGeom>
+            <a:avLst/>
+            <a:gdLst>
+              <a:gd name="connsiteX0" fmla="*/ 9959248 w 9959248"/>
+              <a:gd name="connsiteY0" fmla="*/ 0 h 914400"/>
+              <a:gd name="connsiteX1" fmla="*/ 0 w 9959248"/>
+              <a:gd name="connsiteY1" fmla="*/ 0 h 914400"/>
+              <a:gd name="connsiteX2" fmla="*/ 914400 w 9959248"/>
+              <a:gd name="connsiteY2" fmla="*/ 914400 h 914400"/>
+              <a:gd name="connsiteX3" fmla="*/ 9959248 w 9959248"/>
+              <a:gd name="connsiteY3" fmla="*/ 914400 h 914400"/>
+              <a:gd name="connsiteX4" fmla="*/ 9959248 w 9959248"/>
+              <a:gd name="connsiteY4" fmla="*/ 0 h 914400"/>
+            </a:gdLst>
+            <a:ahLst/>
+            <a:cxnLst>
+              <a:cxn ang="0">
+                <a:pos x="connsiteX0" y="connsiteY0"/>
+              </a:cxn>
+              <a:cxn ang="0">
+                <a:pos x="connsiteX1" y="connsiteY1"/>
+              </a:cxn>
+              <a:cxn ang="0">
+                <a:pos x="connsiteX2" y="connsiteY2"/>
+              </a:cxn>
+              <a:cxn ang="0">
+                <a:pos x="connsiteX3" y="connsiteY3"/>
+              </a:cxn>
+              <a:cxn ang="0">
+                <a:pos x="connsiteX4" y="connsiteY4"/>
+              </a:cxn>
+            </a:cxnLst>
+            <a:rect l="l" t="t" r="r" b="b"/>
+            <a:pathLst>
+              <a:path w="9959248" h="914400">
+                <a:moveTo>
+                  <a:pt x="9959248" y="0"/>
+                </a:moveTo>
+                <a:lnTo>
+                  <a:pt x="0" y="0"/>
+                </a:lnTo>
+                <a:lnTo>
+                  <a:pt x="914400" y="914400"/>
+                </a:lnTo>
+                <a:lnTo>
+                  <a:pt x="9959248" y="914400"/>
+                </a:lnTo>
+                <a:lnTo>
+                  <a:pt x="9959248" y="0"/>
+                </a:lnTo>
+                <a:close/>
+              </a:path>
+            </a:pathLst>
+          </a:custGeom>
+          <a:solidFill>
+            <a:schemeClr val="bg1"/>
+          </a:solidFill>
+          <a:ln>
+            <a:noFill/>
+          </a:ln>
+          <a:effectLst>
+            <a:outerShdw blurRad="127000" dist="63500" dir="1800000" algn="tl" rotWithShape="0">
+              <a:prstClr val="black">
+                <a:alpha val="40000"/>
+              </a:prstClr>
+            </a:outerShdw>
+          </a:effectLst>
+        </p:spPr>
+        <p:style>
+          <a:lnRef idx="2">
+            <a:schemeClr val="accent1">
+              <a:shade val="50000"/>
+            </a:schemeClr>
+          </a:lnRef>
+          <a:fillRef idx="1">
+            <a:schemeClr val="accent1"/>
+          </a:fillRef>
+          <a:effectRef idx="0">
+            <a:schemeClr val="accent1"/>
+          </a:effectRef>
+          <a:fontRef idx="minor">
+            <a:schemeClr val="lt1"/>
+          </a:fontRef>
+        </p:style>
+        <p:txBody>
+          <a:bodyPr rtlCol="0" anchor="ctr"/>
+          <a:lstStyle/>
+          <a:p>
+            <a:pPr algn="ctr"/>
+            <a:endParaRPr lang="en-US"/>
+          </a:p>
+        </p:txBody>
+      </p:sp>
+      <p:sp>
+        <p:nvSpPr>
+          <p:cNvPr id="2" name="Title 1"/>
+          <p:cNvSpPr>
+            <a:spLocks noGrp="1"/>
+          </p:cNvSpPr>
+          <p:nvPr>
+            <p:ph type="title"/>
+          </p:nvPr>
+        </p:nvSpPr>
+        <p:spPr/>
+        <p:txBody>
+          <a:bodyPr/>
+          <a:lstStyle/>
+          <a:p>
+            <a:r>
+              <a:rPr lang="en-US"/>
+              <a:t>Click to edit Master title style</a:t>
+            </a:r>
+          </a:p>
+        </p:txBody>
+      </p:sp>
+      <p:sp>
+        <p:nvSpPr>
+          <p:cNvPr id="3" name="Content Placeholder 2"/>
+          <p:cNvSpPr>
+            <a:spLocks noGrp="1"/>
+          </p:cNvSpPr>
+          <p:nvPr>
+            <p:ph sz="half" idx="1"/>
+          </p:nvPr>
+        </p:nvSpPr>
+        <p:spPr>
+          <a:xfrm>
+            <a:off x="838200" y="1825625"/>
+            <a:ext cx="5181600" cy="4351338"/>
           </a:xfrm>
         </p:spPr>
         <p:txBody>
           <a:bodyPr/>
-          <a:lstStyle>
-            <a:lvl1pPr>
-              <a:defRPr sz="2100"/>
-            </a:lvl1pPr>
-            <a:lvl2pPr>
-              <a:defRPr sz="1800"/>
-            </a:lvl2pPr>
-            <a:lvl3pPr>
-              <a:defRPr sz="1500"/>
-            </a:lvl3pPr>
-            <a:lvl4pPr>
-              <a:defRPr sz="1350"/>
-            </a:lvl4pPr>
-            <a:lvl5pPr>
-              <a:defRPr sz="1350"/>
-            </a:lvl5pPr>
-            <a:lvl6pPr>
-              <a:defRPr sz="1350"/>
-            </a:lvl6pPr>
-            <a:lvl7pPr>
-              <a:defRPr sz="1350"/>
-            </a:lvl7pPr>
-            <a:lvl8pPr>
-              <a:defRPr sz="1350"/>
-            </a:lvl8pPr>
-            <a:lvl9pPr>
-              <a:defRPr sz="1350"/>
-            </a:lvl9pPr>
-          </a:lstStyle>
+          <a:lstStyle/>
           <a:p>
             <a:pPr lvl="0"/>
             <a:r>
@@ -1265,41 +1409,13 @@
         </p:nvSpPr>
         <p:spPr>
           <a:xfrm>
-            <a:off x="4648200" y="1200151"/>
-            <a:ext cx="4038600" cy="3394472"/>
+            <a:off x="6172200" y="1825625"/>
+            <a:ext cx="5181600" cy="4351338"/>
           </a:xfrm>
         </p:spPr>
         <p:txBody>
           <a:bodyPr/>
-          <a:lstStyle>
-            <a:lvl1pPr>
-              <a:defRPr sz="2100"/>
-            </a:lvl1pPr>
-            <a:lvl2pPr>
-              <a:defRPr sz="1800"/>
-            </a:lvl2pPr>
-            <a:lvl3pPr>
-              <a:defRPr sz="1500"/>
-            </a:lvl3pPr>
-            <a:lvl4pPr>
-              <a:defRPr sz="1350"/>
-            </a:lvl4pPr>
-            <a:lvl5pPr>
-              <a:defRPr sz="1350"/>
-            </a:lvl5pPr>
-            <a:lvl6pPr>
-              <a:defRPr sz="1350"/>
-            </a:lvl6pPr>
-            <a:lvl7pPr>
-              <a:defRPr sz="1350"/>
-            </a:lvl7pPr>
-            <a:lvl8pPr>
-              <a:defRPr sz="1350"/>
-            </a:lvl8pPr>
-            <a:lvl9pPr>
-              <a:defRPr sz="1350"/>
-            </a:lvl9pPr>
-          </a:lstStyle>
+          <a:lstStyle/>
           <a:p>
             <a:pPr lvl="0"/>
             <a:r>
@@ -1352,9 +1468,9 @@
           <a:bodyPr/>
           <a:lstStyle/>
           <a:p>
-            <a:fld id="{241EB5C9-1307-BA42-ABA2-0BC069CD8E7F}" type="datetimeFigureOut">
+            <a:fld id="{2ED845B3-3DF6-4317-9DB0-04F5F3CC988F}" type="datetimeFigureOut">
               <a:rPr lang="en-US" smtClean="0"/>
-              <a:t>1/2/22</a:t>
+              <a:t>10/24/2024</a:t>
             </a:fld>
             <a:endParaRPr lang="en-US"/>
           </a:p>
@@ -1394,7 +1510,7 @@
           <a:bodyPr/>
           <a:lstStyle/>
           <a:p>
-            <a:fld id="{C5EF2332-01BF-834F-8236-50238282D533}" type="slidenum">
+            <a:fld id="{B1ACB710-0265-4668-9FC1-C9C0EDA73F24}" type="slidenum">
               <a:rPr lang="en-US" smtClean="0"/>
               <a:t>‹#›</a:t>
             </a:fld>
@@ -1405,7 +1521,7 @@
     </p:spTree>
     <p:extLst>
       <p:ext uri="{BB962C8B-B14F-4D97-AF65-F5344CB8AC3E}">
-        <p14:creationId xmlns:p14="http://schemas.microsoft.com/office/powerpoint/2010/main" val="2619886245"/>
+        <p14:creationId xmlns:p14="http://schemas.microsoft.com/office/powerpoint/2010/main" val="2780888215"/>
       </p:ext>
     </p:extLst>
   </p:cSld>
@@ -1434,44 +1550,149 @@
       </p:grpSpPr>
       <p:sp>
         <p:nvSpPr>
-          <p:cNvPr id="2" name="Title 1"/>
-          <p:cNvSpPr>
-            <a:spLocks noGrp="1"/>
-          </p:cNvSpPr>
-          <p:nvPr>
-            <p:ph type="title"/>
-          </p:nvPr>
-        </p:nvSpPr>
-        <p:spPr/>
-        <p:txBody>
-          <a:bodyPr/>
-          <a:lstStyle>
-            <a:lvl1pPr>
-              <a:defRPr/>
-            </a:lvl1pPr>
-          </a:lstStyle>
-          <a:p>
-            <a:r>
-              <a:rPr lang="en-US"/>
-              <a:t>Click to edit Master title style</a:t>
-            </a:r>
-          </a:p>
-        </p:txBody>
-      </p:sp>
-      <p:sp>
-        <p:nvSpPr>
-          <p:cNvPr id="3" name="Text Placeholder 2"/>
-          <p:cNvSpPr>
-            <a:spLocks noGrp="1"/>
-          </p:cNvSpPr>
-          <p:nvPr>
-            <p:ph type="body" idx="1"/>
-          </p:nvPr>
+          <p:cNvPr id="10" name="Freeform 9"/>
+          <p:cNvSpPr/>
+          <p:nvPr userDrawn="1"/>
         </p:nvSpPr>
         <p:spPr>
           <a:xfrm>
-            <a:off x="457200" y="1151335"/>
-            <a:ext cx="4040188" cy="479822"/>
+            <a:off x="2242196" y="337167"/>
+            <a:ext cx="9959248" cy="914400"/>
+          </a:xfrm>
+          <a:custGeom>
+            <a:avLst/>
+            <a:gdLst>
+              <a:gd name="connsiteX0" fmla="*/ 9959248 w 9959248"/>
+              <a:gd name="connsiteY0" fmla="*/ 0 h 914400"/>
+              <a:gd name="connsiteX1" fmla="*/ 0 w 9959248"/>
+              <a:gd name="connsiteY1" fmla="*/ 0 h 914400"/>
+              <a:gd name="connsiteX2" fmla="*/ 914400 w 9959248"/>
+              <a:gd name="connsiteY2" fmla="*/ 914400 h 914400"/>
+              <a:gd name="connsiteX3" fmla="*/ 9959248 w 9959248"/>
+              <a:gd name="connsiteY3" fmla="*/ 914400 h 914400"/>
+              <a:gd name="connsiteX4" fmla="*/ 9959248 w 9959248"/>
+              <a:gd name="connsiteY4" fmla="*/ 0 h 914400"/>
+            </a:gdLst>
+            <a:ahLst/>
+            <a:cxnLst>
+              <a:cxn ang="0">
+                <a:pos x="connsiteX0" y="connsiteY0"/>
+              </a:cxn>
+              <a:cxn ang="0">
+                <a:pos x="connsiteX1" y="connsiteY1"/>
+              </a:cxn>
+              <a:cxn ang="0">
+                <a:pos x="connsiteX2" y="connsiteY2"/>
+              </a:cxn>
+              <a:cxn ang="0">
+                <a:pos x="connsiteX3" y="connsiteY3"/>
+              </a:cxn>
+              <a:cxn ang="0">
+                <a:pos x="connsiteX4" y="connsiteY4"/>
+              </a:cxn>
+            </a:cxnLst>
+            <a:rect l="l" t="t" r="r" b="b"/>
+            <a:pathLst>
+              <a:path w="9959248" h="914400">
+                <a:moveTo>
+                  <a:pt x="9959248" y="0"/>
+                </a:moveTo>
+                <a:lnTo>
+                  <a:pt x="0" y="0"/>
+                </a:lnTo>
+                <a:lnTo>
+                  <a:pt x="914400" y="914400"/>
+                </a:lnTo>
+                <a:lnTo>
+                  <a:pt x="9959248" y="914400"/>
+                </a:lnTo>
+                <a:lnTo>
+                  <a:pt x="9959248" y="0"/>
+                </a:lnTo>
+                <a:close/>
+              </a:path>
+            </a:pathLst>
+          </a:custGeom>
+          <a:solidFill>
+            <a:schemeClr val="bg1"/>
+          </a:solidFill>
+          <a:ln>
+            <a:noFill/>
+          </a:ln>
+          <a:effectLst>
+            <a:outerShdw blurRad="127000" dist="63500" dir="1800000" algn="tl" rotWithShape="0">
+              <a:prstClr val="black">
+                <a:alpha val="40000"/>
+              </a:prstClr>
+            </a:outerShdw>
+          </a:effectLst>
+        </p:spPr>
+        <p:style>
+          <a:lnRef idx="2">
+            <a:schemeClr val="accent1">
+              <a:shade val="50000"/>
+            </a:schemeClr>
+          </a:lnRef>
+          <a:fillRef idx="1">
+            <a:schemeClr val="accent1"/>
+          </a:fillRef>
+          <a:effectRef idx="0">
+            <a:schemeClr val="accent1"/>
+          </a:effectRef>
+          <a:fontRef idx="minor">
+            <a:schemeClr val="lt1"/>
+          </a:fontRef>
+        </p:style>
+        <p:txBody>
+          <a:bodyPr rtlCol="0" anchor="ctr"/>
+          <a:lstStyle/>
+          <a:p>
+            <a:pPr algn="ctr"/>
+            <a:endParaRPr lang="en-US"/>
+          </a:p>
+        </p:txBody>
+      </p:sp>
+      <p:sp>
+        <p:nvSpPr>
+          <p:cNvPr id="2" name="Title 1"/>
+          <p:cNvSpPr>
+            <a:spLocks noGrp="1"/>
+          </p:cNvSpPr>
+          <p:nvPr>
+            <p:ph type="title"/>
+          </p:nvPr>
+        </p:nvSpPr>
+        <p:spPr>
+          <a:xfrm>
+            <a:off x="3322102" y="351873"/>
+            <a:ext cx="8869897" cy="867327"/>
+          </a:xfrm>
+        </p:spPr>
+        <p:txBody>
+          <a:bodyPr/>
+          <a:lstStyle/>
+          <a:p>
+            <a:r>
+              <a:rPr lang="en-US"/>
+              <a:t>Click to edit Master title style</a:t>
+            </a:r>
+          </a:p>
+        </p:txBody>
+      </p:sp>
+      <p:sp>
+        <p:nvSpPr>
+          <p:cNvPr id="3" name="Text Placeholder 2"/>
+          <p:cNvSpPr>
+            <a:spLocks noGrp="1"/>
+          </p:cNvSpPr>
+          <p:nvPr>
+            <p:ph type="body" idx="1"/>
+          </p:nvPr>
+        </p:nvSpPr>
+        <p:spPr>
+          <a:xfrm>
+            <a:off x="839788" y="1681163"/>
+            <a:ext cx="5157787" cy="823912"/>
           </a:xfrm>
         </p:spPr>
         <p:txBody>
@@ -1479,39 +1700,39 @@
           <a:lstStyle>
             <a:lvl1pPr marL="0" indent="0">
               <a:buNone/>
+              <a:defRPr sz="2400" b="1"/>
+            </a:lvl1pPr>
+            <a:lvl2pPr marL="457200" indent="0">
+              <a:buNone/>
+              <a:defRPr sz="2000" b="1"/>
+            </a:lvl2pPr>
+            <a:lvl3pPr marL="914400" indent="0">
+              <a:buNone/>
               <a:defRPr sz="1800" b="1"/>
-            </a:lvl1pPr>
-            <a:lvl2pPr marL="342900" indent="0">
-              <a:buNone/>
-              <a:defRPr sz="1500" b="1"/>
-            </a:lvl2pPr>
-            <a:lvl3pPr marL="685800" indent="0">
-              <a:buNone/>
-              <a:defRPr sz="1350" b="1"/>
             </a:lvl3pPr>
-            <a:lvl4pPr marL="1028700" indent="0">
-              <a:buNone/>
-              <a:defRPr sz="1200" b="1"/>
+            <a:lvl4pPr marL="1371600" indent="0">
+              <a:buNone/>
+              <a:defRPr sz="1600" b="1"/>
             </a:lvl4pPr>
-            <a:lvl5pPr marL="1371600" indent="0">
-              <a:buNone/>
-              <a:defRPr sz="1200" b="1"/>
+            <a:lvl5pPr marL="1828800" indent="0">
+              <a:buNone/>
+              <a:defRPr sz="1600" b="1"/>
             </a:lvl5pPr>
-            <a:lvl6pPr marL="1714500" indent="0">
-              <a:buNone/>
-              <a:defRPr sz="1200" b="1"/>
+            <a:lvl6pPr marL="2286000" indent="0">
+              <a:buNone/>
+              <a:defRPr sz="1600" b="1"/>
             </a:lvl6pPr>
-            <a:lvl7pPr marL="2057400" indent="0">
-              <a:buNone/>
-              <a:defRPr sz="1200" b="1"/>
+            <a:lvl7pPr marL="2743200" indent="0">
+              <a:buNone/>
+              <a:defRPr sz="1600" b="1"/>
             </a:lvl7pPr>
-            <a:lvl8pPr marL="2400300" indent="0">
-              <a:buNone/>
-              <a:defRPr sz="1200" b="1"/>
+            <a:lvl8pPr marL="3200400" indent="0">
+              <a:buNone/>
+              <a:defRPr sz="1600" b="1"/>
             </a:lvl8pPr>
-            <a:lvl9pPr marL="2743200" indent="0">
-              <a:buNone/>
-              <a:defRPr sz="1200" b="1"/>
+            <a:lvl9pPr marL="3657600" indent="0">
+              <a:buNone/>
+              <a:defRPr sz="1600" b="1"/>
             </a:lvl9pPr>
           </a:lstStyle>
           <a:p>
@@ -1535,41 +1756,13 @@
         </p:nvSpPr>
         <p:spPr>
           <a:xfrm>
-            <a:off x="457200" y="1631156"/>
-            <a:ext cx="4040188" cy="2963466"/>
+            <a:off x="839788" y="2505075"/>
+            <a:ext cx="5157787" cy="3684588"/>
           </a:xfrm>
         </p:spPr>
         <p:txBody>
           <a:bodyPr/>
-          <a:lstStyle>
-            <a:lvl1pPr>
-              <a:defRPr sz="1800"/>
-            </a:lvl1pPr>
-            <a:lvl2pPr>
-              <a:defRPr sz="1500"/>
-            </a:lvl2pPr>
-            <a:lvl3pPr>
-              <a:defRPr sz="1350"/>
-            </a:lvl3pPr>
-            <a:lvl4pPr>
-              <a:defRPr sz="1200"/>
-            </a:lvl4pPr>
-            <a:lvl5pPr>
-              <a:defRPr sz="1200"/>
-            </a:lvl5pPr>
-            <a:lvl6pPr>
-              <a:defRPr sz="1200"/>
-            </a:lvl6pPr>
-            <a:lvl7pPr>
-              <a:defRPr sz="1200"/>
-            </a:lvl7pPr>
-            <a:lvl8pPr>
-              <a:defRPr sz="1200"/>
-            </a:lvl8pPr>
-            <a:lvl9pPr>
-              <a:defRPr sz="1200"/>
-            </a:lvl9pPr>
-          </a:lstStyle>
+          <a:lstStyle/>
           <a:p>
             <a:pPr lvl="0"/>
             <a:r>
@@ -1619,8 +1812,8 @@
         </p:nvSpPr>
         <p:spPr>
           <a:xfrm>
-            <a:off x="4645026" y="1151335"/>
-            <a:ext cx="4041775" cy="479822"/>
+            <a:off x="6172200" y="1681163"/>
+            <a:ext cx="5183188" cy="823912"/>
           </a:xfrm>
         </p:spPr>
         <p:txBody>
@@ -1628,39 +1821,39 @@
           <a:lstStyle>
             <a:lvl1pPr marL="0" indent="0">
               <a:buNone/>
+              <a:defRPr sz="2400" b="1"/>
+            </a:lvl1pPr>
+            <a:lvl2pPr marL="457200" indent="0">
+              <a:buNone/>
+              <a:defRPr sz="2000" b="1"/>
+            </a:lvl2pPr>
+            <a:lvl3pPr marL="914400" indent="0">
+              <a:buNone/>
               <a:defRPr sz="1800" b="1"/>
-            </a:lvl1pPr>
-            <a:lvl2pPr marL="342900" indent="0">
-              <a:buNone/>
-              <a:defRPr sz="1500" b="1"/>
-            </a:lvl2pPr>
-            <a:lvl3pPr marL="685800" indent="0">
-              <a:buNone/>
-              <a:defRPr sz="1350" b="1"/>
             </a:lvl3pPr>
-            <a:lvl4pPr marL="1028700" indent="0">
-              <a:buNone/>
-              <a:defRPr sz="1200" b="1"/>
+            <a:lvl4pPr marL="1371600" indent="0">
+              <a:buNone/>
+              <a:defRPr sz="1600" b="1"/>
             </a:lvl4pPr>
-            <a:lvl5pPr marL="1371600" indent="0">
-              <a:buNone/>
-              <a:defRPr sz="1200" b="1"/>
+            <a:lvl5pPr marL="1828800" indent="0">
+              <a:buNone/>
+              <a:defRPr sz="1600" b="1"/>
             </a:lvl5pPr>
-            <a:lvl6pPr marL="1714500" indent="0">
-              <a:buNone/>
-              <a:defRPr sz="1200" b="1"/>
+            <a:lvl6pPr marL="2286000" indent="0">
+              <a:buNone/>
+              <a:defRPr sz="1600" b="1"/>
             </a:lvl6pPr>
-            <a:lvl7pPr marL="2057400" indent="0">
-              <a:buNone/>
-              <a:defRPr sz="1200" b="1"/>
+            <a:lvl7pPr marL="2743200" indent="0">
+              <a:buNone/>
+              <a:defRPr sz="1600" b="1"/>
             </a:lvl7pPr>
-            <a:lvl8pPr marL="2400300" indent="0">
-              <a:buNone/>
-              <a:defRPr sz="1200" b="1"/>
+            <a:lvl8pPr marL="3200400" indent="0">
+              <a:buNone/>
+              <a:defRPr sz="1600" b="1"/>
             </a:lvl8pPr>
-            <a:lvl9pPr marL="2743200" indent="0">
-              <a:buNone/>
-              <a:defRPr sz="1200" b="1"/>
+            <a:lvl9pPr marL="3657600" indent="0">
+              <a:buNone/>
+              <a:defRPr sz="1600" b="1"/>
             </a:lvl9pPr>
           </a:lstStyle>
           <a:p>
@@ -1684,41 +1877,13 @@
         </p:nvSpPr>
         <p:spPr>
           <a:xfrm>
-            <a:off x="4645026" y="1631156"/>
-            <a:ext cx="4041775" cy="2963466"/>
+            <a:off x="6172200" y="2505075"/>
+            <a:ext cx="5183188" cy="3684588"/>
           </a:xfrm>
         </p:spPr>
         <p:txBody>
           <a:bodyPr/>
-          <a:lstStyle>
-            <a:lvl1pPr>
-              <a:defRPr sz="1800"/>
-            </a:lvl1pPr>
-            <a:lvl2pPr>
-              <a:defRPr sz="1500"/>
-            </a:lvl2pPr>
-            <a:lvl3pPr>
-              <a:defRPr sz="1350"/>
-            </a:lvl3pPr>
-            <a:lvl4pPr>
-              <a:defRPr sz="1200"/>
-            </a:lvl4pPr>
-            <a:lvl5pPr>
-              <a:defRPr sz="1200"/>
-            </a:lvl5pPr>
-            <a:lvl6pPr>
-              <a:defRPr sz="1200"/>
-            </a:lvl6pPr>
-            <a:lvl7pPr>
-              <a:defRPr sz="1200"/>
-            </a:lvl7pPr>
-            <a:lvl8pPr>
-              <a:defRPr sz="1200"/>
-            </a:lvl8pPr>
-            <a:lvl9pPr>
-              <a:defRPr sz="1200"/>
-            </a:lvl9pPr>
-          </a:lstStyle>
+          <a:lstStyle/>
           <a:p>
             <a:pPr lvl="0"/>
             <a:r>
@@ -1771,9 +1936,9 @@
           <a:bodyPr/>
           <a:lstStyle/>
           <a:p>
-            <a:fld id="{241EB5C9-1307-BA42-ABA2-0BC069CD8E7F}" type="datetimeFigureOut">
+            <a:fld id="{2ED845B3-3DF6-4317-9DB0-04F5F3CC988F}" type="datetimeFigureOut">
               <a:rPr lang="en-US" smtClean="0"/>
-              <a:t>1/2/22</a:t>
+              <a:t>10/24/2024</a:t>
             </a:fld>
             <a:endParaRPr lang="en-US"/>
           </a:p>
@@ -1813,7 +1978,7 @@
           <a:bodyPr/>
           <a:lstStyle/>
           <a:p>
-            <a:fld id="{C5EF2332-01BF-834F-8236-50238282D533}" type="slidenum">
+            <a:fld id="{B1ACB710-0265-4668-9FC1-C9C0EDA73F24}" type="slidenum">
               <a:rPr lang="en-US" smtClean="0"/>
               <a:t>‹#›</a:t>
             </a:fld>
@@ -1824,7 +1989,7 @@
     </p:spTree>
     <p:extLst>
       <p:ext uri="{BB962C8B-B14F-4D97-AF65-F5344CB8AC3E}">
-        <p14:creationId xmlns:p14="http://schemas.microsoft.com/office/powerpoint/2010/main" val="2535793967"/>
+        <p14:creationId xmlns:p14="http://schemas.microsoft.com/office/powerpoint/2010/main" val="3034413128"/>
       </p:ext>
     </p:extLst>
   </p:cSld>
@@ -1853,6 +2018,110 @@
       </p:grpSpPr>
       <p:sp>
         <p:nvSpPr>
+          <p:cNvPr id="7" name="Freeform 6"/>
+          <p:cNvSpPr/>
+          <p:nvPr userDrawn="1"/>
+        </p:nvSpPr>
+        <p:spPr>
+          <a:xfrm>
+            <a:off x="2242196" y="337167"/>
+            <a:ext cx="9959248" cy="914400"/>
+          </a:xfrm>
+          <a:custGeom>
+            <a:avLst/>
+            <a:gdLst>
+              <a:gd name="connsiteX0" fmla="*/ 9959248 w 9959248"/>
+              <a:gd name="connsiteY0" fmla="*/ 0 h 914400"/>
+              <a:gd name="connsiteX1" fmla="*/ 0 w 9959248"/>
+              <a:gd name="connsiteY1" fmla="*/ 0 h 914400"/>
+              <a:gd name="connsiteX2" fmla="*/ 914400 w 9959248"/>
+              <a:gd name="connsiteY2" fmla="*/ 914400 h 914400"/>
+              <a:gd name="connsiteX3" fmla="*/ 9959248 w 9959248"/>
+              <a:gd name="connsiteY3" fmla="*/ 914400 h 914400"/>
+              <a:gd name="connsiteX4" fmla="*/ 9959248 w 9959248"/>
+              <a:gd name="connsiteY4" fmla="*/ 0 h 914400"/>
+            </a:gdLst>
+            <a:ahLst/>
+            <a:cxnLst>
+              <a:cxn ang="0">
+                <a:pos x="connsiteX0" y="connsiteY0"/>
+              </a:cxn>
+              <a:cxn ang="0">
+                <a:pos x="connsiteX1" y="connsiteY1"/>
+              </a:cxn>
+              <a:cxn ang="0">
+                <a:pos x="connsiteX2" y="connsiteY2"/>
+              </a:cxn>
+              <a:cxn ang="0">
+                <a:pos x="connsiteX3" y="connsiteY3"/>
+              </a:cxn>
+              <a:cxn ang="0">
+                <a:pos x="connsiteX4" y="connsiteY4"/>
+              </a:cxn>
+            </a:cxnLst>
+            <a:rect l="l" t="t" r="r" b="b"/>
+            <a:pathLst>
+              <a:path w="9959248" h="914400">
+                <a:moveTo>
+                  <a:pt x="9959248" y="0"/>
+                </a:moveTo>
+                <a:lnTo>
+                  <a:pt x="0" y="0"/>
+                </a:lnTo>
+                <a:lnTo>
+                  <a:pt x="914400" y="914400"/>
+                </a:lnTo>
+                <a:lnTo>
+                  <a:pt x="9959248" y="914400"/>
+                </a:lnTo>
+                <a:lnTo>
+                  <a:pt x="9959248" y="0"/>
+                </a:lnTo>
+                <a:close/>
+              </a:path>
+            </a:pathLst>
+          </a:custGeom>
+          <a:solidFill>
+            <a:schemeClr val="bg1"/>
+          </a:solidFill>
+          <a:ln>
+            <a:noFill/>
+          </a:ln>
+          <a:effectLst>
+            <a:outerShdw blurRad="127000" dist="63500" dir="1800000" algn="tl" rotWithShape="0">
+              <a:prstClr val="black">
+                <a:alpha val="40000"/>
+              </a:prstClr>
+            </a:outerShdw>
+          </a:effectLst>
+        </p:spPr>
+        <p:style>
+          <a:lnRef idx="2">
+            <a:schemeClr val="accent1">
+              <a:shade val="50000"/>
+            </a:schemeClr>
+          </a:lnRef>
+          <a:fillRef idx="1">
+            <a:schemeClr val="accent1"/>
+          </a:fillRef>
+          <a:effectRef idx="0">
+            <a:schemeClr val="accent1"/>
+          </a:effectRef>
+          <a:fontRef idx="minor">
+            <a:schemeClr val="lt1"/>
+          </a:fontRef>
+        </p:style>
+        <p:txBody>
+          <a:bodyPr rtlCol="0" anchor="ctr"/>
+          <a:lstStyle/>
+          <a:p>
+            <a:pPr algn="ctr"/>
+            <a:endParaRPr lang="en-US"/>
+          </a:p>
+        </p:txBody>
+      </p:sp>
+      <p:sp>
+        <p:nvSpPr>
           <p:cNvPr id="2" name="Title 1"/>
           <p:cNvSpPr>
             <a:spLocks noGrp="1"/>
@@ -1888,9 +2157,9 @@
           <a:bodyPr/>
           <a:lstStyle/>
           <a:p>
-            <a:fld id="{241EB5C9-1307-BA42-ABA2-0BC069CD8E7F}" type="datetimeFigureOut">
+            <a:fld id="{2ED845B3-3DF6-4317-9DB0-04F5F3CC988F}" type="datetimeFigureOut">
               <a:rPr lang="en-US" smtClean="0"/>
-              <a:t>1/2/22</a:t>
+              <a:t>10/24/2024</a:t>
             </a:fld>
             <a:endParaRPr lang="en-US"/>
           </a:p>
@@ -1930,7 +2199,7 @@
           <a:bodyPr/>
           <a:lstStyle/>
           <a:p>
-            <a:fld id="{C5EF2332-01BF-834F-8236-50238282D533}" type="slidenum">
+            <a:fld id="{B1ACB710-0265-4668-9FC1-C9C0EDA73F24}" type="slidenum">
               <a:rPr lang="en-US" smtClean="0"/>
               <a:t>‹#›</a:t>
             </a:fld>
@@ -1941,7 +2210,7 @@
     </p:spTree>
     <p:extLst>
       <p:ext uri="{BB962C8B-B14F-4D97-AF65-F5344CB8AC3E}">
-        <p14:creationId xmlns:p14="http://schemas.microsoft.com/office/powerpoint/2010/main" val="3472721253"/>
+        <p14:creationId xmlns:p14="http://schemas.microsoft.com/office/powerpoint/2010/main" val="113691761"/>
       </p:ext>
     </p:extLst>
   </p:cSld>
@@ -1983,9 +2252,9 @@
           <a:bodyPr/>
           <a:lstStyle/>
           <a:p>
-            <a:fld id="{241EB5C9-1307-BA42-ABA2-0BC069CD8E7F}" type="datetimeFigureOut">
+            <a:fld id="{2ED845B3-3DF6-4317-9DB0-04F5F3CC988F}" type="datetimeFigureOut">
               <a:rPr lang="en-US" smtClean="0"/>
-              <a:t>1/2/22</a:t>
+              <a:t>10/24/2024</a:t>
             </a:fld>
             <a:endParaRPr lang="en-US"/>
           </a:p>
@@ -2025,7 +2294,7 @@
           <a:bodyPr/>
           <a:lstStyle/>
           <a:p>
-            <a:fld id="{C5EF2332-01BF-834F-8236-50238282D533}" type="slidenum">
+            <a:fld id="{B1ACB710-0265-4668-9FC1-C9C0EDA73F24}" type="slidenum">
               <a:rPr lang="en-US" smtClean="0"/>
               <a:t>‹#›</a:t>
             </a:fld>
@@ -2036,7 +2305,7 @@
     </p:spTree>
     <p:extLst>
       <p:ext uri="{BB962C8B-B14F-4D97-AF65-F5344CB8AC3E}">
-        <p14:creationId xmlns:p14="http://schemas.microsoft.com/office/powerpoint/2010/main" val="2130901097"/>
+        <p14:creationId xmlns:p14="http://schemas.microsoft.com/office/powerpoint/2010/main" val="1788379389"/>
       </p:ext>
     </p:extLst>
   </p:cSld>
@@ -2047,7 +2316,7 @@
 </file>
 
 <file path=ppt/slideLayouts/slideLayout8.xml><?xml version="1.0" encoding="utf-8"?>
-<p:sldLayout xmlns:a="http://schemas.openxmlformats.org/drawingml/2006/main" xmlns:r="http://schemas.openxmlformats.org/officeDocument/2006/relationships" xmlns:p="http://schemas.openxmlformats.org/presentationml/2006/main" type="objTx" preserve="1">
+<p:sldLayout xmlns:a="http://schemas.openxmlformats.org/drawingml/2006/main" xmlns:r="http://schemas.openxmlformats.org/officeDocument/2006/relationships" xmlns:p="http://schemas.openxmlformats.org/presentationml/2006/main" preserve="1" userDrawn="1">
   <p:cSld name="Content with Caption">
     <p:spTree>
       <p:nvGrpSpPr>
@@ -2065,80 +2334,246 @@
       </p:grpSpPr>
       <p:sp>
         <p:nvSpPr>
-          <p:cNvPr id="2" name="Title 1"/>
-          <p:cNvSpPr>
-            <a:spLocks noGrp="1"/>
-          </p:cNvSpPr>
-          <p:nvPr>
-            <p:ph type="title"/>
-          </p:nvPr>
+          <p:cNvPr id="9" name="Freeform 8"/>
+          <p:cNvSpPr/>
+          <p:nvPr userDrawn="1"/>
         </p:nvSpPr>
         <p:spPr>
           <a:xfrm>
-            <a:off x="457201" y="204787"/>
-            <a:ext cx="3008313" cy="871538"/>
+            <a:off x="2242196" y="337167"/>
+            <a:ext cx="9959248" cy="914400"/>
+          </a:xfrm>
+          <a:custGeom>
+            <a:avLst/>
+            <a:gdLst>
+              <a:gd name="connsiteX0" fmla="*/ 9959248 w 9959248"/>
+              <a:gd name="connsiteY0" fmla="*/ 0 h 914400"/>
+              <a:gd name="connsiteX1" fmla="*/ 0 w 9959248"/>
+              <a:gd name="connsiteY1" fmla="*/ 0 h 914400"/>
+              <a:gd name="connsiteX2" fmla="*/ 914400 w 9959248"/>
+              <a:gd name="connsiteY2" fmla="*/ 914400 h 914400"/>
+              <a:gd name="connsiteX3" fmla="*/ 9959248 w 9959248"/>
+              <a:gd name="connsiteY3" fmla="*/ 914400 h 914400"/>
+              <a:gd name="connsiteX4" fmla="*/ 9959248 w 9959248"/>
+              <a:gd name="connsiteY4" fmla="*/ 0 h 914400"/>
+            </a:gdLst>
+            <a:ahLst/>
+            <a:cxnLst>
+              <a:cxn ang="0">
+                <a:pos x="connsiteX0" y="connsiteY0"/>
+              </a:cxn>
+              <a:cxn ang="0">
+                <a:pos x="connsiteX1" y="connsiteY1"/>
+              </a:cxn>
+              <a:cxn ang="0">
+                <a:pos x="connsiteX2" y="connsiteY2"/>
+              </a:cxn>
+              <a:cxn ang="0">
+                <a:pos x="connsiteX3" y="connsiteY3"/>
+              </a:cxn>
+              <a:cxn ang="0">
+                <a:pos x="connsiteX4" y="connsiteY4"/>
+              </a:cxn>
+            </a:cxnLst>
+            <a:rect l="l" t="t" r="r" b="b"/>
+            <a:pathLst>
+              <a:path w="9959248" h="914400">
+                <a:moveTo>
+                  <a:pt x="9959248" y="0"/>
+                </a:moveTo>
+                <a:lnTo>
+                  <a:pt x="0" y="0"/>
+                </a:lnTo>
+                <a:lnTo>
+                  <a:pt x="914400" y="914400"/>
+                </a:lnTo>
+                <a:lnTo>
+                  <a:pt x="9959248" y="914400"/>
+                </a:lnTo>
+                <a:lnTo>
+                  <a:pt x="9959248" y="0"/>
+                </a:lnTo>
+                <a:close/>
+              </a:path>
+            </a:pathLst>
+          </a:custGeom>
+          <a:solidFill>
+            <a:schemeClr val="bg1"/>
+          </a:solidFill>
+          <a:ln>
+            <a:noFill/>
+          </a:ln>
+          <a:effectLst>
+            <a:outerShdw blurRad="127000" dist="63500" dir="1800000" algn="tl" rotWithShape="0">
+              <a:prstClr val="black">
+                <a:alpha val="40000"/>
+              </a:prstClr>
+            </a:outerShdw>
+          </a:effectLst>
+        </p:spPr>
+        <p:style>
+          <a:lnRef idx="2">
+            <a:schemeClr val="accent1">
+              <a:shade val="50000"/>
+            </a:schemeClr>
+          </a:lnRef>
+          <a:fillRef idx="1">
+            <a:schemeClr val="accent1"/>
+          </a:fillRef>
+          <a:effectRef idx="0">
+            <a:schemeClr val="accent1"/>
+          </a:effectRef>
+          <a:fontRef idx="minor">
+            <a:schemeClr val="lt1"/>
+          </a:fontRef>
+        </p:style>
+        <p:txBody>
+          <a:bodyPr rtlCol="0" anchor="ctr"/>
+          <a:lstStyle/>
+          <a:p>
+            <a:pPr algn="ctr"/>
+            <a:endParaRPr lang="en-US"/>
+          </a:p>
+        </p:txBody>
+      </p:sp>
+      <p:sp>
+        <p:nvSpPr>
+          <p:cNvPr id="3" name="Content Placeholder 2"/>
+          <p:cNvSpPr>
+            <a:spLocks noGrp="1"/>
+          </p:cNvSpPr>
+          <p:nvPr>
+            <p:ph idx="1"/>
+          </p:nvPr>
+        </p:nvSpPr>
+        <p:spPr>
+          <a:xfrm>
+            <a:off x="5183188" y="1417983"/>
+            <a:ext cx="6172200" cy="4443067"/>
           </a:xfrm>
         </p:spPr>
         <p:txBody>
-          <a:bodyPr anchor="b"/>
+          <a:bodyPr/>
           <a:lstStyle>
-            <a:lvl1pPr algn="l">
-              <a:defRPr sz="1500" b="1"/>
+            <a:lvl1pPr>
+              <a:defRPr sz="3200"/>
             </a:lvl1pPr>
+            <a:lvl2pPr>
+              <a:defRPr sz="2800"/>
+            </a:lvl2pPr>
+            <a:lvl3pPr>
+              <a:defRPr sz="2400"/>
+            </a:lvl3pPr>
+            <a:lvl4pPr>
+              <a:defRPr sz="2000"/>
+            </a:lvl4pPr>
+            <a:lvl5pPr>
+              <a:defRPr sz="2000"/>
+            </a:lvl5pPr>
+            <a:lvl6pPr>
+              <a:defRPr sz="2000"/>
+            </a:lvl6pPr>
+            <a:lvl7pPr>
+              <a:defRPr sz="2000"/>
+            </a:lvl7pPr>
+            <a:lvl8pPr>
+              <a:defRPr sz="2000"/>
+            </a:lvl8pPr>
+            <a:lvl9pPr>
+              <a:defRPr sz="2000"/>
+            </a:lvl9pPr>
           </a:lstStyle>
           <a:p>
-            <a:r>
-              <a:rPr lang="en-US"/>
-              <a:t>Click to edit Master title style</a:t>
-            </a:r>
-          </a:p>
-        </p:txBody>
-      </p:sp>
-      <p:sp>
-        <p:nvSpPr>
-          <p:cNvPr id="3" name="Content Placeholder 2"/>
-          <p:cNvSpPr>
-            <a:spLocks noGrp="1"/>
-          </p:cNvSpPr>
-          <p:nvPr>
-            <p:ph idx="1"/>
+            <a:pPr lvl="0"/>
+            <a:r>
+              <a:rPr lang="en-US"/>
+              <a:t>Click to edit Master text styles</a:t>
+            </a:r>
+          </a:p>
+          <a:p>
+            <a:pPr lvl="1"/>
+            <a:r>
+              <a:rPr lang="en-US"/>
+              <a:t>Second level</a:t>
+            </a:r>
+          </a:p>
+          <a:p>
+            <a:pPr lvl="2"/>
+            <a:r>
+              <a:rPr lang="en-US"/>
+              <a:t>Third level</a:t>
+            </a:r>
+          </a:p>
+          <a:p>
+            <a:pPr lvl="3"/>
+            <a:r>
+              <a:rPr lang="en-US"/>
+              <a:t>Fourth level</a:t>
+            </a:r>
+          </a:p>
+          <a:p>
+            <a:pPr lvl="4"/>
+            <a:r>
+              <a:rPr lang="en-US"/>
+              <a:t>Fifth level</a:t>
+            </a:r>
+          </a:p>
+        </p:txBody>
+      </p:sp>
+      <p:sp>
+        <p:nvSpPr>
+          <p:cNvPr id="4" name="Text Placeholder 3"/>
+          <p:cNvSpPr>
+            <a:spLocks noGrp="1"/>
+          </p:cNvSpPr>
+          <p:nvPr>
+            <p:ph type="body" sz="half" idx="2"/>
           </p:nvPr>
         </p:nvSpPr>
         <p:spPr>
           <a:xfrm>
-            <a:off x="3575050" y="204788"/>
-            <a:ext cx="5111750" cy="4389835"/>
+            <a:off x="839788" y="2057400"/>
+            <a:ext cx="3932237" cy="3811588"/>
           </a:xfrm>
         </p:spPr>
         <p:txBody>
           <a:bodyPr/>
           <a:lstStyle>
-            <a:lvl1pPr>
-              <a:defRPr sz="2400"/>
+            <a:lvl1pPr marL="0" indent="0">
+              <a:buNone/>
+              <a:defRPr sz="1600"/>
             </a:lvl1pPr>
-            <a:lvl2pPr>
-              <a:defRPr sz="2100"/>
+            <a:lvl2pPr marL="457200" indent="0">
+              <a:buNone/>
+              <a:defRPr sz="1400"/>
             </a:lvl2pPr>
-            <a:lvl3pPr>
-              <a:defRPr sz="1800"/>
+            <a:lvl3pPr marL="914400" indent="0">
+              <a:buNone/>
+              <a:defRPr sz="1200"/>
             </a:lvl3pPr>
-            <a:lvl4pPr>
-              <a:defRPr sz="1500"/>
+            <a:lvl4pPr marL="1371600" indent="0">
+              <a:buNone/>
+              <a:defRPr sz="1000"/>
             </a:lvl4pPr>
-            <a:lvl5pPr>
-              <a:defRPr sz="1500"/>
+            <a:lvl5pPr marL="1828800" indent="0">
+              <a:buNone/>
+              <a:defRPr sz="1000"/>
             </a:lvl5pPr>
-            <a:lvl6pPr>
-              <a:defRPr sz="1500"/>
+            <a:lvl6pPr marL="2286000" indent="0">
+              <a:buNone/>
+              <a:defRPr sz="1000"/>
             </a:lvl6pPr>
-            <a:lvl7pPr>
-              <a:defRPr sz="1500"/>
+            <a:lvl7pPr marL="2743200" indent="0">
+              <a:buNone/>
+              <a:defRPr sz="1000"/>
             </a:lvl7pPr>
-            <a:lvl8pPr>
-              <a:defRPr sz="1500"/>
+            <a:lvl8pPr marL="3200400" indent="0">
+              <a:buNone/>
+              <a:defRPr sz="1000"/>
             </a:lvl8pPr>
-            <a:lvl9pPr>
-              <a:defRPr sz="1500"/>
+            <a:lvl9pPr marL="3657600" indent="0">
+              <a:buNone/>
+              <a:defRPr sz="1000"/>
             </a:lvl9pPr>
           </a:lstStyle>
           <a:p>
@@ -2148,99 +2583,6 @@
               <a:t>Click to edit Master text styles</a:t>
             </a:r>
           </a:p>
-          <a:p>
-            <a:pPr lvl="1"/>
-            <a:r>
-              <a:rPr lang="en-US"/>
-              <a:t>Second level</a:t>
-            </a:r>
-          </a:p>
-          <a:p>
-            <a:pPr lvl="2"/>
-            <a:r>
-              <a:rPr lang="en-US"/>
-              <a:t>Third level</a:t>
-            </a:r>
-          </a:p>
-          <a:p>
-            <a:pPr lvl="3"/>
-            <a:r>
-              <a:rPr lang="en-US"/>
-              <a:t>Fourth level</a:t>
-            </a:r>
-          </a:p>
-          <a:p>
-            <a:pPr lvl="4"/>
-            <a:r>
-              <a:rPr lang="en-US"/>
-              <a:t>Fifth level</a:t>
-            </a:r>
-          </a:p>
-        </p:txBody>
-      </p:sp>
-      <p:sp>
-        <p:nvSpPr>
-          <p:cNvPr id="4" name="Text Placeholder 3"/>
-          <p:cNvSpPr>
-            <a:spLocks noGrp="1"/>
-          </p:cNvSpPr>
-          <p:nvPr>
-            <p:ph type="body" sz="half" idx="2"/>
-          </p:nvPr>
-        </p:nvSpPr>
-        <p:spPr>
-          <a:xfrm>
-            <a:off x="457201" y="1076326"/>
-            <a:ext cx="3008313" cy="3518297"/>
-          </a:xfrm>
-        </p:spPr>
-        <p:txBody>
-          <a:bodyPr/>
-          <a:lstStyle>
-            <a:lvl1pPr marL="0" indent="0">
-              <a:buNone/>
-              <a:defRPr sz="1050"/>
-            </a:lvl1pPr>
-            <a:lvl2pPr marL="342900" indent="0">
-              <a:buNone/>
-              <a:defRPr sz="900"/>
-            </a:lvl2pPr>
-            <a:lvl3pPr marL="685800" indent="0">
-              <a:buNone/>
-              <a:defRPr sz="750"/>
-            </a:lvl3pPr>
-            <a:lvl4pPr marL="1028700" indent="0">
-              <a:buNone/>
-              <a:defRPr sz="675"/>
-            </a:lvl4pPr>
-            <a:lvl5pPr marL="1371600" indent="0">
-              <a:buNone/>
-              <a:defRPr sz="675"/>
-            </a:lvl5pPr>
-            <a:lvl6pPr marL="1714500" indent="0">
-              <a:buNone/>
-              <a:defRPr sz="675"/>
-            </a:lvl6pPr>
-            <a:lvl7pPr marL="2057400" indent="0">
-              <a:buNone/>
-              <a:defRPr sz="675"/>
-            </a:lvl7pPr>
-            <a:lvl8pPr marL="2400300" indent="0">
-              <a:buNone/>
-              <a:defRPr sz="675"/>
-            </a:lvl8pPr>
-            <a:lvl9pPr marL="2743200" indent="0">
-              <a:buNone/>
-              <a:defRPr sz="675"/>
-            </a:lvl9pPr>
-          </a:lstStyle>
-          <a:p>
-            <a:pPr lvl="0"/>
-            <a:r>
-              <a:rPr lang="en-US"/>
-              <a:t>Click to edit Master text styles</a:t>
-            </a:r>
-          </a:p>
         </p:txBody>
       </p:sp>
       <p:sp>
@@ -2258,9 +2600,9 @@
           <a:bodyPr/>
           <a:lstStyle/>
           <a:p>
-            <a:fld id="{241EB5C9-1307-BA42-ABA2-0BC069CD8E7F}" type="datetimeFigureOut">
+            <a:fld id="{2ED845B3-3DF6-4317-9DB0-04F5F3CC988F}" type="datetimeFigureOut">
               <a:rPr lang="en-US" smtClean="0"/>
-              <a:t>1/2/22</a:t>
+              <a:t>10/24/2024</a:t>
             </a:fld>
             <a:endParaRPr lang="en-US"/>
           </a:p>
@@ -2300,7 +2642,7 @@
           <a:bodyPr/>
           <a:lstStyle/>
           <a:p>
-            <a:fld id="{C5EF2332-01BF-834F-8236-50238282D533}" type="slidenum">
+            <a:fld id="{B1ACB710-0265-4668-9FC1-C9C0EDA73F24}" type="slidenum">
               <a:rPr lang="en-US" smtClean="0"/>
               <a:t>‹#›</a:t>
             </a:fld>
@@ -2308,10 +2650,58 @@
           </a:p>
         </p:txBody>
       </p:sp>
+      <p:sp>
+        <p:nvSpPr>
+          <p:cNvPr id="8" name="Title 1"/>
+          <p:cNvSpPr txBox="1">
+            <a:spLocks/>
+          </p:cNvSpPr>
+          <p:nvPr userDrawn="1"/>
+        </p:nvSpPr>
+        <p:spPr>
+          <a:xfrm>
+            <a:off x="3322104" y="338622"/>
+            <a:ext cx="8869896" cy="895234"/>
+          </a:xfrm>
+          <a:prstGeom prst="rect">
+            <a:avLst/>
+          </a:prstGeom>
+        </p:spPr>
+        <p:txBody>
+          <a:bodyPr vert="horz" lIns="91440" tIns="45720" rIns="91440" bIns="45720" rtlCol="0" anchor="ctr">
+            <a:normAutofit/>
+          </a:bodyPr>
+          <a:lstStyle>
+            <a:lvl1pPr algn="l" defTabSz="914400" rtl="0" eaLnBrk="1" latinLnBrk="0" hangingPunct="1">
+              <a:lnSpc>
+                <a:spcPct val="90000"/>
+              </a:lnSpc>
+              <a:spcBef>
+                <a:spcPct val="0"/>
+              </a:spcBef>
+              <a:buNone/>
+              <a:defRPr sz="4400" b="1" kern="1200">
+                <a:solidFill>
+                  <a:srgbClr val="0070C0"/>
+                </a:solidFill>
+                <a:latin typeface="+mj-lt"/>
+                <a:ea typeface="+mj-ea"/>
+                <a:cs typeface="+mj-cs"/>
+              </a:defRPr>
+            </a:lvl1pPr>
+          </a:lstStyle>
+          <a:p>
+            <a:r>
+              <a:rPr lang="en-US"/>
+              <a:t>Click to edit Master title style</a:t>
+            </a:r>
+          </a:p>
+        </p:txBody>
+      </p:sp>
     </p:spTree>
     <p:extLst>
       <p:ext uri="{BB962C8B-B14F-4D97-AF65-F5344CB8AC3E}">
-        <p14:creationId xmlns:p14="http://schemas.microsoft.com/office/powerpoint/2010/main" val="3540895647"/>
+        <p14:creationId xmlns:p14="http://schemas.microsoft.com/office/powerpoint/2010/main" val="4142112639"/>
       </p:ext>
     </p:extLst>
   </p:cSld>
@@ -2322,7 +2712,7 @@
 </file>
 
 <file path=ppt/slideLayouts/slideLayout9.xml><?xml version="1.0" encoding="utf-8"?>
-<p:sldLayout xmlns:a="http://schemas.openxmlformats.org/drawingml/2006/main" xmlns:r="http://schemas.openxmlformats.org/officeDocument/2006/relationships" xmlns:p="http://schemas.openxmlformats.org/presentationml/2006/main" type="picTx" preserve="1">
+<p:sldLayout xmlns:a="http://schemas.openxmlformats.org/drawingml/2006/main" xmlns:r="http://schemas.openxmlformats.org/officeDocument/2006/relationships" xmlns:p="http://schemas.openxmlformats.org/presentationml/2006/main" preserve="1" userDrawn="1">
   <p:cSld name="Picture with Caption">
     <p:spTree>
       <p:nvGrpSpPr>
@@ -2340,49 +2730,183 @@
       </p:grpSpPr>
       <p:sp>
         <p:nvSpPr>
-          <p:cNvPr id="2" name="Title 1"/>
-          <p:cNvSpPr>
-            <a:spLocks noGrp="1"/>
-          </p:cNvSpPr>
-          <p:nvPr>
-            <p:ph type="title"/>
-          </p:nvPr>
+          <p:cNvPr id="9" name="Freeform 8"/>
+          <p:cNvSpPr/>
+          <p:nvPr userDrawn="1"/>
         </p:nvSpPr>
         <p:spPr>
           <a:xfrm>
-            <a:off x="1792288" y="3600450"/>
-            <a:ext cx="5486400" cy="425054"/>
+            <a:off x="2242196" y="337167"/>
+            <a:ext cx="9959248" cy="914400"/>
+          </a:xfrm>
+          <a:custGeom>
+            <a:avLst/>
+            <a:gdLst>
+              <a:gd name="connsiteX0" fmla="*/ 9959248 w 9959248"/>
+              <a:gd name="connsiteY0" fmla="*/ 0 h 914400"/>
+              <a:gd name="connsiteX1" fmla="*/ 0 w 9959248"/>
+              <a:gd name="connsiteY1" fmla="*/ 0 h 914400"/>
+              <a:gd name="connsiteX2" fmla="*/ 914400 w 9959248"/>
+              <a:gd name="connsiteY2" fmla="*/ 914400 h 914400"/>
+              <a:gd name="connsiteX3" fmla="*/ 9959248 w 9959248"/>
+              <a:gd name="connsiteY3" fmla="*/ 914400 h 914400"/>
+              <a:gd name="connsiteX4" fmla="*/ 9959248 w 9959248"/>
+              <a:gd name="connsiteY4" fmla="*/ 0 h 914400"/>
+            </a:gdLst>
+            <a:ahLst/>
+            <a:cxnLst>
+              <a:cxn ang="0">
+                <a:pos x="connsiteX0" y="connsiteY0"/>
+              </a:cxn>
+              <a:cxn ang="0">
+                <a:pos x="connsiteX1" y="connsiteY1"/>
+              </a:cxn>
+              <a:cxn ang="0">
+                <a:pos x="connsiteX2" y="connsiteY2"/>
+              </a:cxn>
+              <a:cxn ang="0">
+                <a:pos x="connsiteX3" y="connsiteY3"/>
+              </a:cxn>
+              <a:cxn ang="0">
+                <a:pos x="connsiteX4" y="connsiteY4"/>
+              </a:cxn>
+            </a:cxnLst>
+            <a:rect l="l" t="t" r="r" b="b"/>
+            <a:pathLst>
+              <a:path w="9959248" h="914400">
+                <a:moveTo>
+                  <a:pt x="9959248" y="0"/>
+                </a:moveTo>
+                <a:lnTo>
+                  <a:pt x="0" y="0"/>
+                </a:lnTo>
+                <a:lnTo>
+                  <a:pt x="914400" y="914400"/>
+                </a:lnTo>
+                <a:lnTo>
+                  <a:pt x="9959248" y="914400"/>
+                </a:lnTo>
+                <a:lnTo>
+                  <a:pt x="9959248" y="0"/>
+                </a:lnTo>
+                <a:close/>
+              </a:path>
+            </a:pathLst>
+          </a:custGeom>
+          <a:solidFill>
+            <a:schemeClr val="bg1"/>
+          </a:solidFill>
+          <a:ln>
+            <a:noFill/>
+          </a:ln>
+          <a:effectLst>
+            <a:outerShdw blurRad="127000" dist="63500" dir="1800000" algn="tl" rotWithShape="0">
+              <a:prstClr val="black">
+                <a:alpha val="40000"/>
+              </a:prstClr>
+            </a:outerShdw>
+          </a:effectLst>
+        </p:spPr>
+        <p:style>
+          <a:lnRef idx="2">
+            <a:schemeClr val="accent1">
+              <a:shade val="50000"/>
+            </a:schemeClr>
+          </a:lnRef>
+          <a:fillRef idx="1">
+            <a:schemeClr val="accent1"/>
+          </a:fillRef>
+          <a:effectRef idx="0">
+            <a:schemeClr val="accent1"/>
+          </a:effectRef>
+          <a:fontRef idx="minor">
+            <a:schemeClr val="lt1"/>
+          </a:fontRef>
+        </p:style>
+        <p:txBody>
+          <a:bodyPr rtlCol="0" anchor="ctr"/>
+          <a:lstStyle/>
+          <a:p>
+            <a:pPr algn="ctr"/>
+            <a:endParaRPr lang="en-US"/>
+          </a:p>
+        </p:txBody>
+      </p:sp>
+      <p:sp>
+        <p:nvSpPr>
+          <p:cNvPr id="3" name="Picture Placeholder 2"/>
+          <p:cNvSpPr>
+            <a:spLocks noGrp="1"/>
+          </p:cNvSpPr>
+          <p:nvPr>
+            <p:ph type="pic" idx="1"/>
+          </p:nvPr>
+        </p:nvSpPr>
+        <p:spPr>
+          <a:xfrm>
+            <a:off x="5183188" y="1497496"/>
+            <a:ext cx="6172200" cy="4363554"/>
           </a:xfrm>
         </p:spPr>
         <p:txBody>
-          <a:bodyPr anchor="b"/>
+          <a:bodyPr/>
           <a:lstStyle>
-            <a:lvl1pPr algn="l">
-              <a:defRPr sz="1500" b="1"/>
+            <a:lvl1pPr marL="0" indent="0">
+              <a:buNone/>
+              <a:defRPr sz="3200"/>
             </a:lvl1pPr>
+            <a:lvl2pPr marL="457200" indent="0">
+              <a:buNone/>
+              <a:defRPr sz="2800"/>
+            </a:lvl2pPr>
+            <a:lvl3pPr marL="914400" indent="0">
+              <a:buNone/>
+              <a:defRPr sz="2400"/>
+            </a:lvl3pPr>
+            <a:lvl4pPr marL="1371600" indent="0">
+              <a:buNone/>
+              <a:defRPr sz="2000"/>
+            </a:lvl4pPr>
+            <a:lvl5pPr marL="1828800" indent="0">
+              <a:buNone/>
+              <a:defRPr sz="2000"/>
+            </a:lvl5pPr>
+            <a:lvl6pPr marL="2286000" indent="0">
+              <a:buNone/>
+              <a:defRPr sz="2000"/>
+            </a:lvl6pPr>
+            <a:lvl7pPr marL="2743200" indent="0">
+              <a:buNone/>
+              <a:defRPr sz="2000"/>
+            </a:lvl7pPr>
+            <a:lvl8pPr marL="3200400" indent="0">
+              <a:buNone/>
+              <a:defRPr sz="2000"/>
+            </a:lvl8pPr>
+            <a:lvl9pPr marL="3657600" indent="0">
+              <a:buNone/>
+              <a:defRPr sz="2000"/>
+            </a:lvl9pPr>
           </a:lstStyle>
           <a:p>
-            <a:r>
-              <a:rPr lang="en-US"/>
-              <a:t>Click to edit Master title style</a:t>
-            </a:r>
-          </a:p>
-        </p:txBody>
-      </p:sp>
-      <p:sp>
-        <p:nvSpPr>
-          <p:cNvPr id="3" name="Picture Placeholder 2"/>
-          <p:cNvSpPr>
-            <a:spLocks noGrp="1"/>
-          </p:cNvSpPr>
-          <p:nvPr>
-            <p:ph type="pic" idx="1"/>
+            <a:endParaRPr lang="en-US"/>
+          </a:p>
+        </p:txBody>
+      </p:sp>
+      <p:sp>
+        <p:nvSpPr>
+          <p:cNvPr id="4" name="Text Placeholder 3"/>
+          <p:cNvSpPr>
+            <a:spLocks noGrp="1"/>
+          </p:cNvSpPr>
+          <p:nvPr>
+            <p:ph type="body" sz="half" idx="2"/>
           </p:nvPr>
         </p:nvSpPr>
         <p:spPr>
           <a:xfrm>
-            <a:off x="1792288" y="459581"/>
-            <a:ext cx="5486400" cy="3086100"/>
+            <a:off x="839788" y="2057400"/>
+            <a:ext cx="3932237" cy="3811588"/>
           </a:xfrm>
         </p:spPr>
         <p:txBody>
@@ -2390,103 +2914,42 @@
           <a:lstStyle>
             <a:lvl1pPr marL="0" indent="0">
               <a:buNone/>
-              <a:defRPr sz="2400"/>
+              <a:defRPr sz="1600"/>
             </a:lvl1pPr>
-            <a:lvl2pPr marL="342900" indent="0">
-              <a:buNone/>
-              <a:defRPr sz="2100"/>
+            <a:lvl2pPr marL="457200" indent="0">
+              <a:buNone/>
+              <a:defRPr sz="1400"/>
             </a:lvl2pPr>
-            <a:lvl3pPr marL="685800" indent="0">
-              <a:buNone/>
-              <a:defRPr sz="1800"/>
+            <a:lvl3pPr marL="914400" indent="0">
+              <a:buNone/>
+              <a:defRPr sz="1200"/>
             </a:lvl3pPr>
-            <a:lvl4pPr marL="1028700" indent="0">
-              <a:buNone/>
-              <a:defRPr sz="1500"/>
+            <a:lvl4pPr marL="1371600" indent="0">
+              <a:buNone/>
+              <a:defRPr sz="1000"/>
             </a:lvl4pPr>
-            <a:lvl5pPr marL="1371600" indent="0">
-              <a:buNone/>
-              <a:defRPr sz="1500"/>
+            <a:lvl5pPr marL="1828800" indent="0">
+              <a:buNone/>
+              <a:defRPr sz="1000"/>
             </a:lvl5pPr>
-            <a:lvl6pPr marL="1714500" indent="0">
-              <a:buNone/>
-              <a:defRPr sz="1500"/>
+            <a:lvl6pPr marL="2286000" indent="0">
+              <a:buNone/>
+              <a:defRPr sz="1000"/>
             </a:lvl6pPr>
-            <a:lvl7pPr marL="2057400" indent="0">
-              <a:buNone/>
-              <a:defRPr sz="1500"/>
+            <a:lvl7pPr marL="2743200" indent="0">
+              <a:buNone/>
+              <a:defRPr sz="1000"/>
             </a:lvl7pPr>
-            <a:lvl8pPr marL="2400300" indent="0">
-              <a:buNone/>
-              <a:defRPr sz="1500"/>
+            <a:lvl8pPr marL="3200400" indent="0">
+              <a:buNone/>
+              <a:defRPr sz="1000"/>
             </a:lvl8pPr>
-            <a:lvl9pPr marL="2743200" indent="0">
-              <a:buNone/>
-              <a:defRPr sz="1500"/>
+            <a:lvl9pPr marL="3657600" indent="0">
+              <a:buNone/>
+              <a:defRPr sz="1000"/>
             </a:lvl9pPr>
           </a:lstStyle>
           <a:p>
-            <a:endParaRPr lang="en-US"/>
-          </a:p>
-        </p:txBody>
-      </p:sp>
-      <p:sp>
-        <p:nvSpPr>
-          <p:cNvPr id="4" name="Text Placeholder 3"/>
-          <p:cNvSpPr>
-            <a:spLocks noGrp="1"/>
-          </p:cNvSpPr>
-          <p:nvPr>
-            <p:ph type="body" sz="half" idx="2"/>
-          </p:nvPr>
-        </p:nvSpPr>
-        <p:spPr>
-          <a:xfrm>
-            <a:off x="1792288" y="4025503"/>
-            <a:ext cx="5486400" cy="603647"/>
-          </a:xfrm>
-        </p:spPr>
-        <p:txBody>
-          <a:bodyPr/>
-          <a:lstStyle>
-            <a:lvl1pPr marL="0" indent="0">
-              <a:buNone/>
-              <a:defRPr sz="1050"/>
-            </a:lvl1pPr>
-            <a:lvl2pPr marL="342900" indent="0">
-              <a:buNone/>
-              <a:defRPr sz="900"/>
-            </a:lvl2pPr>
-            <a:lvl3pPr marL="685800" indent="0">
-              <a:buNone/>
-              <a:defRPr sz="750"/>
-            </a:lvl3pPr>
-            <a:lvl4pPr marL="1028700" indent="0">
-              <a:buNone/>
-              <a:defRPr sz="675"/>
-            </a:lvl4pPr>
-            <a:lvl5pPr marL="1371600" indent="0">
-              <a:buNone/>
-              <a:defRPr sz="675"/>
-            </a:lvl5pPr>
-            <a:lvl6pPr marL="1714500" indent="0">
-              <a:buNone/>
-              <a:defRPr sz="675"/>
-            </a:lvl6pPr>
-            <a:lvl7pPr marL="2057400" indent="0">
-              <a:buNone/>
-              <a:defRPr sz="675"/>
-            </a:lvl7pPr>
-            <a:lvl8pPr marL="2400300" indent="0">
-              <a:buNone/>
-              <a:defRPr sz="675"/>
-            </a:lvl8pPr>
-            <a:lvl9pPr marL="2743200" indent="0">
-              <a:buNone/>
-              <a:defRPr sz="675"/>
-            </a:lvl9pPr>
-          </a:lstStyle>
-          <a:p>
             <a:pPr lvl="0"/>
             <a:r>
               <a:rPr lang="en-US"/>
@@ -2510,9 +2973,9 @@
           <a:bodyPr/>
           <a:lstStyle/>
           <a:p>
-            <a:fld id="{241EB5C9-1307-BA42-ABA2-0BC069CD8E7F}" type="datetimeFigureOut">
+            <a:fld id="{2ED845B3-3DF6-4317-9DB0-04F5F3CC988F}" type="datetimeFigureOut">
               <a:rPr lang="en-US" smtClean="0"/>
-              <a:t>1/2/22</a:t>
+              <a:t>10/24/2024</a:t>
             </a:fld>
             <a:endParaRPr lang="en-US"/>
           </a:p>
@@ -2552,7 +3015,7 @@
           <a:bodyPr/>
           <a:lstStyle/>
           <a:p>
-            <a:fld id="{C5EF2332-01BF-834F-8236-50238282D533}" type="slidenum">
+            <a:fld id="{B1ACB710-0265-4668-9FC1-C9C0EDA73F24}" type="slidenum">
               <a:rPr lang="en-US" smtClean="0"/>
               <a:t>‹#›</a:t>
             </a:fld>
@@ -2560,10 +3023,37 @@
           </a:p>
         </p:txBody>
       </p:sp>
+      <p:sp>
+        <p:nvSpPr>
+          <p:cNvPr id="8" name="Title 1"/>
+          <p:cNvSpPr>
+            <a:spLocks noGrp="1"/>
+          </p:cNvSpPr>
+          <p:nvPr>
+            <p:ph type="title"/>
+          </p:nvPr>
+        </p:nvSpPr>
+        <p:spPr>
+          <a:xfrm>
+            <a:off x="3322104" y="338622"/>
+            <a:ext cx="8869896" cy="895234"/>
+          </a:xfrm>
+        </p:spPr>
+        <p:txBody>
+          <a:bodyPr/>
+          <a:lstStyle/>
+          <a:p>
+            <a:r>
+              <a:rPr lang="en-US"/>
+              <a:t>Click to edit Master title style</a:t>
+            </a:r>
+          </a:p>
+        </p:txBody>
+      </p:sp>
     </p:spTree>
     <p:extLst>
       <p:ext uri="{BB962C8B-B14F-4D97-AF65-F5344CB8AC3E}">
-        <p14:creationId xmlns:p14="http://schemas.microsoft.com/office/powerpoint/2010/main" val="3566899855"/>
+        <p14:creationId xmlns:p14="http://schemas.microsoft.com/office/powerpoint/2010/main" val="3741109176"/>
       </p:ext>
     </p:extLst>
   </p:cSld>
@@ -2577,9 +3067,26 @@
 <p:sldMaster xmlns:a="http://schemas.openxmlformats.org/drawingml/2006/main" xmlns:p="http://schemas.openxmlformats.org/presentationml/2006/main" xmlns:r="http://schemas.openxmlformats.org/officeDocument/2006/relationships">
   <p:cSld>
     <p:bg>
-      <p:bgRef idx="1001">
-        <a:schemeClr val="bg1"/>
-      </p:bgRef>
+      <p:bgPr>
+        <a:gradFill flip="none" rotWithShape="1">
+          <a:gsLst>
+            <a:gs pos="100000">
+              <a:schemeClr val="bg1"/>
+            </a:gs>
+            <a:gs pos="0">
+              <a:schemeClr val="bg1"/>
+            </a:gs>
+            <a:gs pos="100000">
+              <a:srgbClr val="DFE0E2"/>
+            </a:gs>
+          </a:gsLst>
+          <a:path path="circle">
+            <a:fillToRect b="50000" l="50000" r="50000" t="50000"/>
+          </a:path>
+          <a:tileRect/>
+        </a:gradFill>
+        <a:effectLst/>
+      </p:bgPr>
     </p:bg>
     <p:spTree>
       <p:nvGrpSpPr>
@@ -2597,121 +3104,89 @@
       </p:grpSpPr>
       <p:sp>
         <p:nvSpPr>
-          <p:cNvPr id="2" name="Title Placeholder 1"/>
-          <p:cNvSpPr>
-            <a:spLocks noGrp="1"/>
-          </p:cNvSpPr>
-          <p:nvPr>
-            <p:ph type="title"/>
+          <p:cNvPr id="3" name="Text Placeholder 2"/>
+          <p:cNvSpPr>
+            <a:spLocks noGrp="1"/>
+          </p:cNvSpPr>
+          <p:nvPr>
+            <p:ph idx="1" type="body"/>
           </p:nvPr>
         </p:nvSpPr>
         <p:spPr>
           <a:xfrm>
-            <a:off x="457200" y="205979"/>
-            <a:ext cx="8229600" cy="857250"/>
+            <a:off x="470721" y="1500731"/>
+            <a:ext cx="11257453" cy="4676232"/>
           </a:xfrm>
           <a:prstGeom prst="rect">
             <a:avLst/>
           </a:prstGeom>
         </p:spPr>
         <p:txBody>
-          <a:bodyPr anchor="ctr" bIns="45720" lIns="91440" rIns="91440" rtlCol="0" tIns="45720" vert="horz">
+          <a:bodyPr bIns="45720" lIns="91440" rIns="91440" rtlCol="0" tIns="45720" vert="horz">
             <a:normAutofit/>
           </a:bodyPr>
           <a:lstStyle/>
           <a:p>
-            <a:r>
-              <a:rPr lang="en-US"/>
-              <a:t>Click to edit Master title style</a:t>
-            </a:r>
-          </a:p>
-        </p:txBody>
-      </p:sp>
-      <p:sp>
-        <p:nvSpPr>
-          <p:cNvPr id="3" name="Text Placeholder 2"/>
-          <p:cNvSpPr>
-            <a:spLocks noGrp="1"/>
-          </p:cNvSpPr>
-          <p:nvPr>
-            <p:ph idx="1" type="body"/>
+            <a:pPr lvl="0"/>
+            <a:r>
+              <a:rPr lang="en-US"/>
+              <a:t>Click to edit Master text styles</a:t>
+            </a:r>
+          </a:p>
+          <a:p>
+            <a:pPr lvl="1"/>
+            <a:r>
+              <a:rPr lang="en-US"/>
+              <a:t>Second level</a:t>
+            </a:r>
+          </a:p>
+          <a:p>
+            <a:pPr lvl="2"/>
+            <a:r>
+              <a:rPr lang="en-US"/>
+              <a:t>Third level</a:t>
+            </a:r>
+          </a:p>
+          <a:p>
+            <a:pPr lvl="3"/>
+            <a:r>
+              <a:rPr lang="en-US"/>
+              <a:t>Fourth level</a:t>
+            </a:r>
+          </a:p>
+          <a:p>
+            <a:pPr lvl="4"/>
+            <a:r>
+              <a:rPr lang="en-US"/>
+              <a:t>Fifth level</a:t>
+            </a:r>
+          </a:p>
+        </p:txBody>
+      </p:sp>
+      <p:sp>
+        <p:nvSpPr>
+          <p:cNvPr id="4" name="Date Placeholder 3"/>
+          <p:cNvSpPr>
+            <a:spLocks noGrp="1"/>
+          </p:cNvSpPr>
+          <p:nvPr>
+            <p:ph idx="2" sz="half" type="dt"/>
           </p:nvPr>
         </p:nvSpPr>
         <p:spPr>
           <a:xfrm>
-            <a:off x="457200" y="1200151"/>
-            <a:ext cx="8229600" cy="3394472"/>
+            <a:off x="135834" y="6356350"/>
+            <a:ext cx="2743200" cy="365125"/>
           </a:xfrm>
           <a:prstGeom prst="rect">
             <a:avLst/>
           </a:prstGeom>
         </p:spPr>
         <p:txBody>
-          <a:bodyPr bIns="45720" lIns="91440" rIns="91440" rtlCol="0" tIns="45720" vert="horz">
-            <a:normAutofit/>
-          </a:bodyPr>
-          <a:lstStyle/>
-          <a:p>
-            <a:pPr lvl="0"/>
-            <a:r>
-              <a:rPr lang="en-US"/>
-              <a:t>Click to edit Master text styles</a:t>
-            </a:r>
-          </a:p>
-          <a:p>
-            <a:pPr lvl="1"/>
-            <a:r>
-              <a:rPr lang="en-US"/>
-              <a:t>Second level</a:t>
-            </a:r>
-          </a:p>
-          <a:p>
-            <a:pPr lvl="2"/>
-            <a:r>
-              <a:rPr lang="en-US"/>
-              <a:t>Third level</a:t>
-            </a:r>
-          </a:p>
-          <a:p>
-            <a:pPr lvl="3"/>
-            <a:r>
-              <a:rPr lang="en-US"/>
-              <a:t>Fourth level</a:t>
-            </a:r>
-          </a:p>
-          <a:p>
-            <a:pPr lvl="4"/>
-            <a:r>
-              <a:rPr lang="en-US"/>
-              <a:t>Fifth level</a:t>
-            </a:r>
-          </a:p>
-        </p:txBody>
-      </p:sp>
-      <p:sp>
-        <p:nvSpPr>
-          <p:cNvPr id="4" name="Date Placeholder 3"/>
-          <p:cNvSpPr>
-            <a:spLocks noGrp="1"/>
-          </p:cNvSpPr>
-          <p:nvPr>
-            <p:ph idx="2" sz="half" type="dt"/>
-          </p:nvPr>
-        </p:nvSpPr>
-        <p:spPr>
-          <a:xfrm>
-            <a:off x="457200" y="4767263"/>
-            <a:ext cx="2133600" cy="273844"/>
-          </a:xfrm>
-          <a:prstGeom prst="rect">
-            <a:avLst/>
-          </a:prstGeom>
-        </p:spPr>
-        <p:txBody>
           <a:bodyPr anchor="ctr" bIns="45720" lIns="91440" rIns="91440" rtlCol="0" tIns="45720" vert="horz"/>
           <a:lstStyle>
             <a:lvl1pPr algn="l">
-              <a:defRPr sz="900">
+              <a:defRPr sz="1200">
                 <a:solidFill>
                   <a:schemeClr val="tx1">
                     <a:tint val="75000"/>
@@ -2721,9 +3196,9 @@
             </a:lvl1pPr>
           </a:lstStyle>
           <a:p>
-            <a:fld id="{241EB5C9-1307-BA42-ABA2-0BC069CD8E7F}" type="datetimeFigureOut">
+            <a:fld id="{2ED845B3-3DF6-4317-9DB0-04F5F3CC988F}" type="datetimeFigureOut">
               <a:rPr lang="en-US" smtClean="0"/>
-              <a:t>1/2/22</a:t>
+              <a:t>10/24/2024</a:t>
             </a:fld>
             <a:endParaRPr lang="en-US"/>
           </a:p>
@@ -2741,8 +3216,8 @@
         </p:nvSpPr>
         <p:spPr>
           <a:xfrm>
-            <a:off x="3124200" y="4767263"/>
-            <a:ext cx="2895600" cy="273844"/>
+            <a:off x="3322103" y="6356350"/>
+            <a:ext cx="5556853" cy="365125"/>
           </a:xfrm>
           <a:prstGeom prst="rect">
             <a:avLst/>
@@ -2752,7 +3227,7 @@
           <a:bodyPr anchor="ctr" bIns="45720" lIns="91440" rIns="91440" rtlCol="0" tIns="45720" vert="horz"/>
           <a:lstStyle>
             <a:lvl1pPr algn="ctr">
-              <a:defRPr sz="900">
+              <a:defRPr sz="1200">
                 <a:solidFill>
                   <a:schemeClr val="tx1">
                     <a:tint val="75000"/>
@@ -2778,8 +3253,8 @@
         </p:nvSpPr>
         <p:spPr>
           <a:xfrm>
-            <a:off x="6553200" y="4767263"/>
-            <a:ext cx="2133600" cy="273844"/>
+            <a:off x="9326218" y="6356350"/>
+            <a:ext cx="2743200" cy="365125"/>
           </a:xfrm>
           <a:prstGeom prst="rect">
             <a:avLst/>
@@ -2789,7 +3264,7 @@
           <a:bodyPr anchor="ctr" bIns="45720" lIns="91440" rIns="91440" rtlCol="0" tIns="45720" vert="horz"/>
           <a:lstStyle>
             <a:lvl1pPr algn="r">
-              <a:defRPr sz="900">
+              <a:defRPr sz="1200">
                 <a:solidFill>
                   <a:schemeClr val="tx1">
                     <a:tint val="75000"/>
@@ -2799,7 +3274,7 @@
             </a:lvl1pPr>
           </a:lstStyle>
           <a:p>
-            <a:fld id="{C5EF2332-01BF-834F-8236-50238282D533}" type="slidenum">
+            <a:fld id="{B1ACB710-0265-4668-9FC1-C9C0EDA73F24}" type="slidenum">
               <a:rPr lang="en-US" smtClean="0"/>
               <a:t>‹#›</a:t>
             </a:fld>
@@ -2807,10 +3282,167 @@
           </a:p>
         </p:txBody>
       </p:sp>
+      <p:sp>
+        <p:nvSpPr>
+          <p:cNvPr id="7" name="Freeform 6"/>
+          <p:cNvSpPr/>
+          <p:nvPr userDrawn="1"/>
+        </p:nvSpPr>
+        <p:spPr>
+          <a:xfrm>
+            <a:off x="0" y="337167"/>
+            <a:ext cx="2963007" cy="923192"/>
+          </a:xfrm>
+          <a:custGeom>
+            <a:avLst/>
+            <a:gdLst>
+              <a:gd fmla="*/ 0 w 2963007" name="connsiteX0"/>
+              <a:gd fmla="*/ 0 h 923192" name="connsiteY0"/>
+              <a:gd fmla="*/ 2039815 w 2963007" name="connsiteX1"/>
+              <a:gd fmla="*/ 0 h 923192" name="connsiteY1"/>
+              <a:gd fmla="*/ 2963007 w 2963007" name="connsiteX2"/>
+              <a:gd fmla="*/ 923192 h 923192" name="connsiteY2"/>
+              <a:gd fmla="*/ 0 w 2963007" name="connsiteX3"/>
+              <a:gd fmla="*/ 923192 h 923192" name="connsiteY3"/>
+            </a:gdLst>
+            <a:ahLst/>
+            <a:cxnLst>
+              <a:cxn ang="0">
+                <a:pos x="connsiteX0" y="connsiteY0"/>
+              </a:cxn>
+              <a:cxn ang="0">
+                <a:pos x="connsiteX1" y="connsiteY1"/>
+              </a:cxn>
+              <a:cxn ang="0">
+                <a:pos x="connsiteX2" y="connsiteY2"/>
+              </a:cxn>
+              <a:cxn ang="0">
+                <a:pos x="connsiteX3" y="connsiteY3"/>
+              </a:cxn>
+            </a:cxnLst>
+            <a:rect b="b" l="l" r="r" t="t"/>
+            <a:pathLst>
+              <a:path h="923192" w="2963007">
+                <a:moveTo>
+                  <a:pt x="0" y="0"/>
+                </a:moveTo>
+                <a:lnTo>
+                  <a:pt x="2039815" y="0"/>
+                </a:lnTo>
+                <a:lnTo>
+                  <a:pt x="2963007" y="923192"/>
+                </a:lnTo>
+                <a:lnTo>
+                  <a:pt x="0" y="923192"/>
+                </a:lnTo>
+              </a:path>
+            </a:pathLst>
+          </a:custGeom>
+          <a:solidFill>
+            <a:schemeClr val="bg1"/>
+          </a:solidFill>
+          <a:ln>
+            <a:noFill/>
+          </a:ln>
+          <a:effectLst>
+            <a:outerShdw algn="tl" blurRad="127000" dir="1800000" dist="63500" rotWithShape="0">
+              <a:prstClr val="black">
+                <a:alpha val="40000"/>
+              </a:prstClr>
+            </a:outerShdw>
+          </a:effectLst>
+        </p:spPr>
+        <p:style>
+          <a:lnRef idx="2">
+            <a:schemeClr val="accent1">
+              <a:shade val="50000"/>
+            </a:schemeClr>
+          </a:lnRef>
+          <a:fillRef idx="1">
+            <a:schemeClr val="accent1"/>
+          </a:fillRef>
+          <a:effectRef idx="0">
+            <a:schemeClr val="accent1"/>
+          </a:effectRef>
+          <a:fontRef idx="minor">
+            <a:schemeClr val="lt1"/>
+          </a:fontRef>
+        </p:style>
+        <p:txBody>
+          <a:bodyPr anchor="ctr" rtlCol="0"/>
+          <a:lstStyle/>
+          <a:p>
+            <a:pPr algn="ctr"/>
+            <a:endParaRPr lang="en-US"/>
+          </a:p>
+        </p:txBody>
+      </p:sp>
+      <p:pic>
+        <p:nvPicPr>
+          <p:cNvPr id="9" name="Picture 8"/>
+          <p:cNvPicPr>
+            <a:picLocks noChangeAspect="1"/>
+          </p:cNvPicPr>
+          <p:nvPr userDrawn="1"/>
+        </p:nvPicPr>
+        <p:blipFill>
+          <a:blip cstate="print" r:embed="rId11">
+            <a:extLst>
+              <a:ext uri="{28A0092B-C50C-407E-A947-70E740481C1C}">
+                <a14:useLocalDpi xmlns:a14="http://schemas.microsoft.com/office/drawing/2010/main" val="0"/>
+              </a:ext>
+            </a:extLst>
+          </a:blip>
+          <a:stretch>
+            <a:fillRect/>
+          </a:stretch>
+        </p:blipFill>
+        <p:spPr>
+          <a:xfrm>
+            <a:off x="470721" y="577539"/>
+            <a:ext cx="1412377" cy="433655"/>
+          </a:xfrm>
+          <a:prstGeom prst="rect">
+            <a:avLst/>
+          </a:prstGeom>
+        </p:spPr>
+      </p:pic>
+      <p:sp>
+        <p:nvSpPr>
+          <p:cNvPr id="2" name="Title Placeholder 1"/>
+          <p:cNvSpPr>
+            <a:spLocks noGrp="1"/>
+          </p:cNvSpPr>
+          <p:nvPr>
+            <p:ph type="title"/>
+          </p:nvPr>
+        </p:nvSpPr>
+        <p:spPr>
+          <a:xfrm>
+            <a:off x="3322104" y="338622"/>
+            <a:ext cx="8869896" cy="895234"/>
+          </a:xfrm>
+          <a:prstGeom prst="rect">
+            <a:avLst/>
+          </a:prstGeom>
+        </p:spPr>
+        <p:txBody>
+          <a:bodyPr anchor="ctr" bIns="45720" lIns="91440" rIns="91440" rtlCol="0" tIns="45720" vert="horz">
+            <a:normAutofit/>
+          </a:bodyPr>
+          <a:lstStyle/>
+          <a:p>
+            <a:r>
+              <a:rPr lang="en-US"/>
+              <a:t>Click to edit Master title style</a:t>
+            </a:r>
+          </a:p>
+        </p:txBody>
+      </p:sp>
     </p:spTree>
     <p:extLst>
       <p:ext uri="{BB962C8B-B14F-4D97-AF65-F5344CB8AC3E}">
-        <p14:creationId xmlns:p14="http://schemas.microsoft.com/office/powerpoint/2010/main" val="3676200875"/>
+        <p14:creationId xmlns:p14="http://schemas.microsoft.com/office/powerpoint/2010/main" val="407850311"/>
       </p:ext>
     </p:extLst>
   </p:cSld>
@@ -2825,19 +3457,20 @@
     <p:sldLayoutId id="2147483655" r:id="rId7"/>
     <p:sldLayoutId id="2147483656" r:id="rId8"/>
     <p:sldLayoutId id="2147483657" r:id="rId9"/>
-    <p:sldLayoutId id="2147483658" r:id="rId10"/>
-    <p:sldLayoutId id="2147483659" r:id="rId11"/>
   </p:sldLayoutIdLst>
   <p:txStyles>
     <p:titleStyle>
-      <a:lvl1pPr algn="ctr" defTabSz="342900" eaLnBrk="1" hangingPunct="1" latinLnBrk="0" rtl="0">
+      <a:lvl1pPr algn="l" defTabSz="914400" eaLnBrk="1" hangingPunct="1" latinLnBrk="0" rtl="0">
+        <a:lnSpc>
+          <a:spcPct val="90000"/>
+        </a:lnSpc>
         <a:spcBef>
           <a:spcPct val="0"/>
         </a:spcBef>
         <a:buNone/>
-        <a:defRPr kern="1200" sz="3300">
+        <a:defRPr b="1" kern="1200" sz="4400">
           <a:solidFill>
-            <a:schemeClr val="tx1"/>
+            <a:srgbClr val="0070C0"/>
           </a:solidFill>
           <a:latin typeface="+mj-lt"/>
           <a:ea typeface="+mj-ea"/>
@@ -2846,11 +3479,32 @@
       </a:lvl1pPr>
     </p:titleStyle>
     <p:bodyStyle>
-      <a:lvl1pPr algn="l" defTabSz="342900" eaLnBrk="1" hangingPunct="1" indent="-342900" latinLnBrk="0" marL="342900" rtl="0">
+      <a:lvl1pPr algn="l" defTabSz="914400" eaLnBrk="1" hangingPunct="1" indent="-228600" latinLnBrk="0" marL="228600" rtl="0">
+        <a:lnSpc>
+          <a:spcPct val="90000"/>
+        </a:lnSpc>
         <a:spcBef>
-          <a:spcPct val="20000"/>
+          <a:spcPts val="1000"/>
         </a:spcBef>
-        <a:buFont typeface="Arial"/>
+        <a:buFont charset="0" panose="020B0604020202020204" pitchFamily="34" typeface="Arial"/>
+        <a:buChar char="•"/>
+        <a:defRPr kern="1200" sz="2800">
+          <a:solidFill>
+            <a:schemeClr val="tx1"/>
+          </a:solidFill>
+          <a:latin typeface="+mn-lt"/>
+          <a:ea typeface="+mn-ea"/>
+          <a:cs typeface="+mn-cs"/>
+        </a:defRPr>
+      </a:lvl1pPr>
+      <a:lvl2pPr algn="l" defTabSz="914400" eaLnBrk="1" hangingPunct="1" indent="-228600" latinLnBrk="0" marL="685800" rtl="0">
+        <a:lnSpc>
+          <a:spcPct val="90000"/>
+        </a:lnSpc>
+        <a:spcBef>
+          <a:spcPts val="500"/>
+        </a:spcBef>
+        <a:buFont charset="0" panose="020B0604020202020204" pitchFamily="34" typeface="Arial"/>
         <a:buChar char="•"/>
         <a:defRPr kern="1200" sz="2400">
           <a:solidFill>
@@ -2860,14 +3514,17 @@
           <a:ea typeface="+mn-ea"/>
           <a:cs typeface="+mn-cs"/>
         </a:defRPr>
-      </a:lvl1pPr>
-      <a:lvl2pPr algn="l" defTabSz="342900" eaLnBrk="1" hangingPunct="1" indent="-342900" latinLnBrk="0" marL="685800" rtl="0">
+      </a:lvl2pPr>
+      <a:lvl3pPr algn="l" defTabSz="914400" eaLnBrk="1" hangingPunct="1" indent="-228600" latinLnBrk="0" marL="1143000" rtl="0">
+        <a:lnSpc>
+          <a:spcPct val="90000"/>
+        </a:lnSpc>
         <a:spcBef>
-          <a:spcPct val="20000"/>
+          <a:spcPts val="500"/>
         </a:spcBef>
-        <a:buFont typeface="Arial"/>
-        <a:buChar char="–"/>
-        <a:defRPr kern="1200" sz="2100">
+        <a:buFont charset="0" panose="020B0604020202020204" pitchFamily="34" typeface="Arial"/>
+        <a:buChar char="•"/>
+        <a:defRPr kern="1200" sz="2000">
           <a:solidFill>
             <a:schemeClr val="tx1"/>
           </a:solidFill>
@@ -2875,12 +3532,15 @@
           <a:ea typeface="+mn-ea"/>
           <a:cs typeface="+mn-cs"/>
         </a:defRPr>
-      </a:lvl2pPr>
-      <a:lvl3pPr algn="l" defTabSz="342900" eaLnBrk="1" hangingPunct="1" indent="-342900" latinLnBrk="0" marL="1028700" rtl="0">
+      </a:lvl3pPr>
+      <a:lvl4pPr algn="l" defTabSz="914400" eaLnBrk="1" hangingPunct="1" indent="-228600" latinLnBrk="0" marL="1600200" rtl="0">
+        <a:lnSpc>
+          <a:spcPct val="90000"/>
+        </a:lnSpc>
         <a:spcBef>
-          <a:spcPct val="20000"/>
+          <a:spcPts val="500"/>
         </a:spcBef>
-        <a:buFont typeface="Arial"/>
+        <a:buFont charset="0" panose="020B0604020202020204" pitchFamily="34" typeface="Arial"/>
         <a:buChar char="•"/>
         <a:defRPr kern="1200" sz="1800">
           <a:solidFill>
@@ -2890,29 +3550,17 @@
           <a:ea typeface="+mn-ea"/>
           <a:cs typeface="+mn-cs"/>
         </a:defRPr>
-      </a:lvl3pPr>
-      <a:lvl4pPr algn="l" defTabSz="342900" eaLnBrk="1" hangingPunct="1" indent="-342900" latinLnBrk="0" marL="1371600" rtl="0">
+      </a:lvl4pPr>
+      <a:lvl5pPr algn="l" defTabSz="914400" eaLnBrk="1" hangingPunct="1" indent="-228600" latinLnBrk="0" marL="2057400" rtl="0">
+        <a:lnSpc>
+          <a:spcPct val="90000"/>
+        </a:lnSpc>
         <a:spcBef>
-          <a:spcPct val="20000"/>
+          <a:spcPts val="500"/>
         </a:spcBef>
-        <a:buFont typeface="Arial"/>
-        <a:buChar char="–"/>
-        <a:defRPr kern="1200" sz="1500">
-          <a:solidFill>
-            <a:schemeClr val="tx1"/>
-          </a:solidFill>
-          <a:latin typeface="+mn-lt"/>
-          <a:ea typeface="+mn-ea"/>
-          <a:cs typeface="+mn-cs"/>
-        </a:defRPr>
-      </a:lvl4pPr>
-      <a:lvl5pPr algn="l" defTabSz="342900" eaLnBrk="1" hangingPunct="1" indent="-342900" latinLnBrk="0" marL="1714500" rtl="0">
-        <a:spcBef>
-          <a:spcPct val="20000"/>
-        </a:spcBef>
-        <a:buFont typeface="Arial"/>
-        <a:buChar char="»"/>
-        <a:defRPr kern="1200" sz="1500">
+        <a:buFont charset="0" panose="020B0604020202020204" pitchFamily="34" typeface="Arial"/>
+        <a:buChar char="•"/>
+        <a:defRPr kern="1200" sz="1800">
           <a:solidFill>
             <a:schemeClr val="tx1"/>
           </a:solidFill>
@@ -2921,13 +3569,16 @@
           <a:cs typeface="+mn-cs"/>
         </a:defRPr>
       </a:lvl5pPr>
-      <a:lvl6pPr algn="l" defTabSz="342900" eaLnBrk="1" hangingPunct="1" indent="-342900" latinLnBrk="0" marL="2057400" rtl="0">
+      <a:lvl6pPr algn="l" defTabSz="914400" eaLnBrk="1" hangingPunct="1" indent="-228600" latinLnBrk="0" marL="2514600" rtl="0">
+        <a:lnSpc>
+          <a:spcPct val="90000"/>
+        </a:lnSpc>
         <a:spcBef>
-          <a:spcPct val="20000"/>
+          <a:spcPts val="500"/>
         </a:spcBef>
-        <a:buFont typeface="Arial"/>
+        <a:buFont charset="0" panose="020B0604020202020204" pitchFamily="34" typeface="Arial"/>
         <a:buChar char="•"/>
-        <a:defRPr kern="1200" sz="1500">
+        <a:defRPr kern="1200" sz="1800">
           <a:solidFill>
             <a:schemeClr val="tx1"/>
           </a:solidFill>
@@ -2936,13 +3587,16 @@
           <a:cs typeface="+mn-cs"/>
         </a:defRPr>
       </a:lvl6pPr>
-      <a:lvl7pPr algn="l" defTabSz="342900" eaLnBrk="1" hangingPunct="1" indent="-342900" latinLnBrk="0" marL="2400300" rtl="0">
+      <a:lvl7pPr algn="l" defTabSz="914400" eaLnBrk="1" hangingPunct="1" indent="-228600" latinLnBrk="0" marL="2971800" rtl="0">
+        <a:lnSpc>
+          <a:spcPct val="90000"/>
+        </a:lnSpc>
         <a:spcBef>
-          <a:spcPct val="20000"/>
+          <a:spcPts val="500"/>
         </a:spcBef>
-        <a:buFont typeface="Arial"/>
+        <a:buFont charset="0" panose="020B0604020202020204" pitchFamily="34" typeface="Arial"/>
         <a:buChar char="•"/>
-        <a:defRPr kern="1200" sz="1500">
+        <a:defRPr kern="1200" sz="1800">
           <a:solidFill>
             <a:schemeClr val="tx1"/>
           </a:solidFill>
@@ -2951,13 +3605,16 @@
           <a:cs typeface="+mn-cs"/>
         </a:defRPr>
       </a:lvl7pPr>
-      <a:lvl8pPr algn="l" defTabSz="342900" eaLnBrk="1" hangingPunct="1" indent="-342900" latinLnBrk="0" marL="2743200" rtl="0">
+      <a:lvl8pPr algn="l" defTabSz="914400" eaLnBrk="1" hangingPunct="1" indent="-228600" latinLnBrk="0" marL="3429000" rtl="0">
+        <a:lnSpc>
+          <a:spcPct val="90000"/>
+        </a:lnSpc>
         <a:spcBef>
-          <a:spcPct val="20000"/>
+          <a:spcPts val="500"/>
         </a:spcBef>
-        <a:buFont typeface="Arial"/>
+        <a:buFont charset="0" panose="020B0604020202020204" pitchFamily="34" typeface="Arial"/>
         <a:buChar char="•"/>
-        <a:defRPr kern="1200" sz="1500">
+        <a:defRPr kern="1200" sz="1800">
           <a:solidFill>
             <a:schemeClr val="tx1"/>
           </a:solidFill>
@@ -2966,13 +3623,16 @@
           <a:cs typeface="+mn-cs"/>
         </a:defRPr>
       </a:lvl8pPr>
-      <a:lvl9pPr algn="l" defTabSz="342900" eaLnBrk="1" hangingPunct="1" indent="-342900" latinLnBrk="0" marL="3086100" rtl="0">
+      <a:lvl9pPr algn="l" defTabSz="914400" eaLnBrk="1" hangingPunct="1" indent="-228600" latinLnBrk="0" marL="3886200" rtl="0">
+        <a:lnSpc>
+          <a:spcPct val="90000"/>
+        </a:lnSpc>
         <a:spcBef>
-          <a:spcPct val="20000"/>
+          <a:spcPts val="500"/>
         </a:spcBef>
-        <a:buFont typeface="Arial"/>
+        <a:buFont charset="0" panose="020B0604020202020204" pitchFamily="34" typeface="Arial"/>
         <a:buChar char="•"/>
-        <a:defRPr kern="1200" sz="1500">
+        <a:defRPr kern="1200" sz="1800">
           <a:solidFill>
             <a:schemeClr val="tx1"/>
           </a:solidFill>
@@ -2986,8 +3646,8 @@
       <a:defPPr>
         <a:defRPr lang="en-US"/>
       </a:defPPr>
-      <a:lvl1pPr algn="l" defTabSz="342900" eaLnBrk="1" hangingPunct="1" latinLnBrk="0" marL="0" rtl="0">
-        <a:defRPr kern="1200" sz="1350">
+      <a:lvl1pPr algn="l" defTabSz="914400" eaLnBrk="1" hangingPunct="1" latinLnBrk="0" marL="0" rtl="0">
+        <a:defRPr kern="1200" sz="1800">
           <a:solidFill>
             <a:schemeClr val="tx1"/>
           </a:solidFill>
@@ -2996,8 +3656,8 @@
           <a:cs typeface="+mn-cs"/>
         </a:defRPr>
       </a:lvl1pPr>
-      <a:lvl2pPr algn="l" defTabSz="342900" eaLnBrk="1" hangingPunct="1" latinLnBrk="0" marL="342900" rtl="0">
-        <a:defRPr kern="1200" sz="1350">
+      <a:lvl2pPr algn="l" defTabSz="914400" eaLnBrk="1" hangingPunct="1" latinLnBrk="0" marL="457200" rtl="0">
+        <a:defRPr kern="1200" sz="1800">
           <a:solidFill>
             <a:schemeClr val="tx1"/>
           </a:solidFill>
@@ -3006,8 +3666,8 @@
           <a:cs typeface="+mn-cs"/>
         </a:defRPr>
       </a:lvl2pPr>
-      <a:lvl3pPr algn="l" defTabSz="342900" eaLnBrk="1" hangingPunct="1" latinLnBrk="0" marL="685800" rtl="0">
-        <a:defRPr kern="1200" sz="1350">
+      <a:lvl3pPr algn="l" defTabSz="914400" eaLnBrk="1" hangingPunct="1" latinLnBrk="0" marL="914400" rtl="0">
+        <a:defRPr kern="1200" sz="1800">
           <a:solidFill>
             <a:schemeClr val="tx1"/>
           </a:solidFill>
@@ -3016,8 +3676,8 @@
           <a:cs typeface="+mn-cs"/>
         </a:defRPr>
       </a:lvl3pPr>
-      <a:lvl4pPr algn="l" defTabSz="342900" eaLnBrk="1" hangingPunct="1" latinLnBrk="0" marL="1028700" rtl="0">
-        <a:defRPr kern="1200" sz="1350">
+      <a:lvl4pPr algn="l" defTabSz="914400" eaLnBrk="1" hangingPunct="1" latinLnBrk="0" marL="1371600" rtl="0">
+        <a:defRPr kern="1200" sz="1800">
           <a:solidFill>
             <a:schemeClr val="tx1"/>
           </a:solidFill>
@@ -3026,8 +3686,8 @@
           <a:cs typeface="+mn-cs"/>
         </a:defRPr>
       </a:lvl4pPr>
-      <a:lvl5pPr algn="l" defTabSz="342900" eaLnBrk="1" hangingPunct="1" latinLnBrk="0" marL="1371600" rtl="0">
-        <a:defRPr kern="1200" sz="1350">
+      <a:lvl5pPr algn="l" defTabSz="914400" eaLnBrk="1" hangingPunct="1" latinLnBrk="0" marL="1828800" rtl="0">
+        <a:defRPr kern="1200" sz="1800">
           <a:solidFill>
             <a:schemeClr val="tx1"/>
           </a:solidFill>
@@ -3036,8 +3696,8 @@
           <a:cs typeface="+mn-cs"/>
         </a:defRPr>
       </a:lvl5pPr>
-      <a:lvl6pPr algn="l" defTabSz="342900" eaLnBrk="1" hangingPunct="1" latinLnBrk="0" marL="1714500" rtl="0">
-        <a:defRPr kern="1200" sz="1350">
+      <a:lvl6pPr algn="l" defTabSz="914400" eaLnBrk="1" hangingPunct="1" latinLnBrk="0" marL="2286000" rtl="0">
+        <a:defRPr kern="1200" sz="1800">
           <a:solidFill>
             <a:schemeClr val="tx1"/>
           </a:solidFill>
@@ -3046,8 +3706,8 @@
           <a:cs typeface="+mn-cs"/>
         </a:defRPr>
       </a:lvl6pPr>
-      <a:lvl7pPr algn="l" defTabSz="342900" eaLnBrk="1" hangingPunct="1" latinLnBrk="0" marL="2057400" rtl="0">
-        <a:defRPr kern="1200" sz="1350">
+      <a:lvl7pPr algn="l" defTabSz="914400" eaLnBrk="1" hangingPunct="1" latinLnBrk="0" marL="2743200" rtl="0">
+        <a:defRPr kern="1200" sz="1800">
           <a:solidFill>
             <a:schemeClr val="tx1"/>
           </a:solidFill>
@@ -3056,8 +3716,8 @@
           <a:cs typeface="+mn-cs"/>
         </a:defRPr>
       </a:lvl7pPr>
-      <a:lvl8pPr algn="l" defTabSz="342900" eaLnBrk="1" hangingPunct="1" latinLnBrk="0" marL="2400300" rtl="0">
-        <a:defRPr kern="1200" sz="1350">
+      <a:lvl8pPr algn="l" defTabSz="914400" eaLnBrk="1" hangingPunct="1" latinLnBrk="0" marL="3200400" rtl="0">
+        <a:defRPr kern="1200" sz="1800">
           <a:solidFill>
             <a:schemeClr val="tx1"/>
           </a:solidFill>
@@ -3066,8 +3726,8 @@
           <a:cs typeface="+mn-cs"/>
         </a:defRPr>
       </a:lvl8pPr>
-      <a:lvl9pPr algn="l" defTabSz="342900" eaLnBrk="1" hangingPunct="1" latinLnBrk="0" marL="2743200" rtl="0">
-        <a:defRPr kern="1200" sz="1350">
+      <a:lvl9pPr algn="l" defTabSz="914400" eaLnBrk="1" hangingPunct="1" latinLnBrk="0" marL="3657600" rtl="0">
+        <a:defRPr kern="1200" sz="1800">
           <a:solidFill>
             <a:schemeClr val="tx1"/>
           </a:solidFill>
@@ -3110,8 +3770,8 @@
         </p:nvSpPr>
         <p:spPr>
           <a:xfrm>
-            <a:off x="685800" y="1597819"/>
-            <a:ext cx="7772400" cy="1102519"/>
+            <a:off x="1524000" y="1470991"/>
+            <a:ext cx="9144000" cy="2038972"/>
           </a:xfrm>
         </p:spPr>
         <p:txBody>
@@ -3140,8 +3800,8 @@
         </p:nvSpPr>
         <p:spPr>
           <a:xfrm>
-            <a:off x="1371600" y="2914650"/>
-            <a:ext cx="6400800" cy="1314450"/>
+            <a:off x="1524000" y="3602038"/>
+            <a:ext cx="9144000" cy="1655762"/>
           </a:xfrm>
         </p:spPr>
         <p:txBody>
@@ -4141,8 +4801,8 @@
         </p:blipFill>
         <p:spPr bwMode="auto">
           <a:xfrm>
-            <a:off x="2705100" y="1193800"/>
-            <a:ext cx="3733800" cy="2882900"/>
+            <a:off x="3403600" y="1498600"/>
+            <a:ext cx="5384800" cy="4165600"/>
           </a:xfrm>
           <a:prstGeom prst="rect">
             <a:avLst/>
@@ -4163,8 +4823,8 @@
         </p:nvSpPr>
         <p:spPr>
           <a:xfrm>
-            <a:off x="457200" y="4076700"/>
-            <a:ext cx="8229600" cy="508000"/>
+            <a:off x="469900" y="5664200"/>
+            <a:ext cx="11252200" cy="508000"/>
           </a:xfrm>
           <a:prstGeom prst="rect">
             <a:avLst/>
@@ -4209,12 +4869,12 @@
       </p:grpSpPr>
       <p:sp>
         <p:nvSpPr>
-          <p:cNvPr id="3" name="Content Placeholder 2"/>
-          <p:cNvSpPr>
-            <a:spLocks noGrp="1"/>
-          </p:cNvSpPr>
-          <p:nvPr>
-            <p:ph idx="1"/>
+          <p:cNvPr id="2" name="Title 1"/>
+          <p:cNvSpPr>
+            <a:spLocks noGrp="1"/>
+          </p:cNvSpPr>
+          <p:nvPr>
+            <p:ph type="title"/>
           </p:nvPr>
         </p:nvSpPr>
         <p:spPr/>
@@ -4227,7 +4887,67 @@
             </a:pPr>
             <a:r>
               <a:rPr/>
-              <a:t>{width = “100%”}</a:t>
+              <a:t>Map of Changes in Affected Monitors</a:t>
+            </a:r>
+          </a:p>
+        </p:txBody>
+      </p:sp>
+      <p:pic>
+        <p:nvPicPr>
+          <p:cNvPr descr="../figs/monitor_map_pm_changes.png" id="0" name="Picture 1"/>
+          <p:cNvPicPr>
+            <a:picLocks noGrp="1" noChangeAspect="1"/>
+          </p:cNvPicPr>
+          <p:nvPr/>
+        </p:nvPicPr>
+        <p:blipFill>
+          <a:blip r:embed="rId2"/>
+          <a:stretch>
+            <a:fillRect/>
+          </a:stretch>
+        </p:blipFill>
+        <p:spPr bwMode="auto">
+          <a:xfrm>
+            <a:off x="3403600" y="1498600"/>
+            <a:ext cx="5384800" cy="4165600"/>
+          </a:xfrm>
+          <a:prstGeom prst="rect">
+            <a:avLst/>
+          </a:prstGeom>
+          <a:noFill/>
+          <a:ln w="9525">
+            <a:noFill/>
+            <a:headEnd/>
+            <a:tailEnd/>
+          </a:ln>
+        </p:spPr>
+      </p:pic>
+      <p:sp>
+        <p:nvSpPr>
+          <p:cNvPr id="1" name="TextBox 3"/>
+          <p:cNvSpPr txBox="1"/>
+          <p:nvPr/>
+        </p:nvSpPr>
+        <p:spPr>
+          <a:xfrm>
+            <a:off x="469900" y="5664200"/>
+            <a:ext cx="11252200" cy="508000"/>
+          </a:xfrm>
+          <a:prstGeom prst="rect">
+            <a:avLst/>
+          </a:prstGeom>
+          <a:noFill/>
+        </p:spPr>
+        <p:txBody>
+          <a:bodyPr/>
+          <a:lstStyle/>
+          <a:p>
+            <a:pPr lvl="0" indent="0" marL="0" algn="ctr">
+              <a:buNone/>
+            </a:pPr>
+            <a:r>
+              <a:rPr/>
+              <a:t>monitor_map_changes</a:t>
             </a:r>
           </a:p>
         </p:txBody>
@@ -4256,12 +4976,12 @@
       </p:grpSpPr>
       <p:sp>
         <p:nvSpPr>
-          <p:cNvPr id="2" name="Title 1"/>
-          <p:cNvSpPr>
-            <a:spLocks noGrp="1"/>
-          </p:cNvSpPr>
-          <p:nvPr>
-            <p:ph type="title"/>
+          <p:cNvPr id="3" name="Content Placeholder 2"/>
+          <p:cNvSpPr>
+            <a:spLocks noGrp="1"/>
+          </p:cNvSpPr>
+          <p:nvPr>
+            <p:ph idx="1"/>
           </p:nvPr>
         </p:nvSpPr>
         <p:spPr/>
@@ -4274,67 +4994,7 @@
             </a:pPr>
             <a:r>
               <a:rPr/>
-              <a:t>Map of Changes in Affected Monitors</a:t>
-            </a:r>
-          </a:p>
-        </p:txBody>
-      </p:sp>
-      <p:pic>
-        <p:nvPicPr>
-          <p:cNvPr descr="../figs/monitor_map_pm_changes.png" id="0" name="Picture 1"/>
-          <p:cNvPicPr>
-            <a:picLocks noGrp="1" noChangeAspect="1"/>
-          </p:cNvPicPr>
-          <p:nvPr/>
-        </p:nvPicPr>
-        <p:blipFill>
-          <a:blip r:embed="rId2"/>
-          <a:stretch>
-            <a:fillRect/>
-          </a:stretch>
-        </p:blipFill>
-        <p:spPr bwMode="auto">
-          <a:xfrm>
-            <a:off x="2705100" y="1193800"/>
-            <a:ext cx="3733800" cy="2882900"/>
-          </a:xfrm>
-          <a:prstGeom prst="rect">
-            <a:avLst/>
-          </a:prstGeom>
-          <a:noFill/>
-          <a:ln w="9525">
-            <a:noFill/>
-            <a:headEnd/>
-            <a:tailEnd/>
-          </a:ln>
-        </p:spPr>
-      </p:pic>
-      <p:sp>
-        <p:nvSpPr>
-          <p:cNvPr id="1" name="TextBox 3"/>
-          <p:cNvSpPr txBox="1"/>
-          <p:nvPr/>
-        </p:nvSpPr>
-        <p:spPr>
-          <a:xfrm>
-            <a:off x="457200" y="4076700"/>
-            <a:ext cx="8229600" cy="508000"/>
-          </a:xfrm>
-          <a:prstGeom prst="rect">
-            <a:avLst/>
-          </a:prstGeom>
-          <a:noFill/>
-        </p:spPr>
-        <p:txBody>
-          <a:bodyPr/>
-          <a:lstStyle/>
-          <a:p>
-            <a:pPr lvl="0" indent="0" marL="0" algn="ctr">
-              <a:buNone/>
-            </a:pPr>
-            <a:r>
-              <a:rPr/>
-              <a:t>monitor_map_changes</a:t>
+              <a:t>)</a:t>
             </a:r>
           </a:p>
         </p:txBody>
@@ -4345,53 +5005,6 @@
 </file>
 
 <file path=ppt/slides/slide8.xml><?xml version="1.0" encoding="utf-8"?>
-<p:sld xmlns:a="http://schemas.openxmlformats.org/drawingml/2006/main" xmlns:r="http://schemas.openxmlformats.org/officeDocument/2006/relationships" xmlns:p="http://schemas.openxmlformats.org/presentationml/2006/main">
-  <p:cSld>
-    <p:spTree>
-      <p:nvGrpSpPr>
-        <p:cNvPr id="1" name=""/>
-        <p:cNvGrpSpPr/>
-        <p:nvPr/>
-      </p:nvGrpSpPr>
-      <p:grpSpPr>
-        <a:xfrm>
-          <a:off x="0" y="0"/>
-          <a:ext cx="0" cy="0"/>
-          <a:chOff x="0" y="0"/>
-          <a:chExt cx="0" cy="0"/>
-        </a:xfrm>
-      </p:grpSpPr>
-      <p:sp>
-        <p:nvSpPr>
-          <p:cNvPr id="3" name="Content Placeholder 2"/>
-          <p:cNvSpPr>
-            <a:spLocks noGrp="1"/>
-          </p:cNvSpPr>
-          <p:nvPr>
-            <p:ph idx="1"/>
-          </p:nvPr>
-        </p:nvSpPr>
-        <p:spPr/>
-        <p:txBody>
-          <a:bodyPr/>
-          <a:lstStyle/>
-          <a:p>
-            <a:pPr lvl="0" indent="0" marL="0">
-              <a:buNone/>
-            </a:pPr>
-            <a:r>
-              <a:rPr/>
-              <a:t>){width = 11in}</a:t>
-            </a:r>
-          </a:p>
-        </p:txBody>
-      </p:sp>
-    </p:spTree>
-  </p:cSld>
-</p:sld>
-</file>
-
-<file path=ppt/slides/slide9.xml><?xml version="1.0" encoding="utf-8"?>
 <p:sld xmlns:a="http://schemas.openxmlformats.org/drawingml/2006/main" xmlns:r="http://schemas.openxmlformats.org/officeDocument/2006/relationships" xmlns:p="http://schemas.openxmlformats.org/presentationml/2006/main">
   <p:cSld>
     <p:spTree>
@@ -4600,326 +5213,6 @@
 </file>
 
 <file path=ppt/theme/theme1.xml><?xml version="1.0" encoding="utf-8"?>
-<a:theme xmlns:a="http://schemas.openxmlformats.org/drawingml/2006/main" name="Office Theme">
-  <a:themeElements>
-    <a:clrScheme name="Office">
-      <a:dk1>
-        <a:sysClr val="windowText" lastClr="000000"/>
-      </a:dk1>
-      <a:lt1>
-        <a:sysClr val="window" lastClr="FFFFFF"/>
-      </a:lt1>
-      <a:dk2>
-        <a:srgbClr val="1F497D"/>
-      </a:dk2>
-      <a:lt2>
-        <a:srgbClr val="EEECE1"/>
-      </a:lt2>
-      <a:accent1>
-        <a:srgbClr val="4F81BD"/>
-      </a:accent1>
-      <a:accent2>
-        <a:srgbClr val="C0504D"/>
-      </a:accent2>
-      <a:accent3>
-        <a:srgbClr val="9BBB59"/>
-      </a:accent3>
-      <a:accent4>
-        <a:srgbClr val="8064A2"/>
-      </a:accent4>
-      <a:accent5>
-        <a:srgbClr val="4BACC6"/>
-      </a:accent5>
-      <a:accent6>
-        <a:srgbClr val="F79646"/>
-      </a:accent6>
-      <a:hlink>
-        <a:srgbClr val="0000FF"/>
-      </a:hlink>
-      <a:folHlink>
-        <a:srgbClr val="800080"/>
-      </a:folHlink>
-    </a:clrScheme>
-    <a:fontScheme name="Office">
-      <a:majorFont>
-        <a:latin typeface="Calibri"/>
-        <a:ea typeface=""/>
-        <a:cs typeface=""/>
-        <a:font script="Jpan" typeface="ＭＳ Ｐゴシック"/>
-        <a:font script="Hang" typeface="맑은 고딕"/>
-        <a:font script="Hans" typeface="宋体"/>
-        <a:font script="Hant" typeface="新細明體"/>
-        <a:font script="Arab" typeface="Times New Roman"/>
-        <a:font script="Hebr" typeface="Times New Roman"/>
-        <a:font script="Thai" typeface="Angsana New"/>
-        <a:font script="Ethi" typeface="Nyala"/>
-        <a:font script="Beng" typeface="Vrinda"/>
-        <a:font script="Gujr" typeface="Shruti"/>
-        <a:font script="Khmr" typeface="MoolBoran"/>
-        <a:font script="Knda" typeface="Tunga"/>
-        <a:font script="Guru" typeface="Raavi"/>
-        <a:font script="Cans" typeface="Euphemia"/>
-        <a:font script="Cher" typeface="Plantagenet Cherokee"/>
-        <a:font script="Yiii" typeface="Microsoft Yi Baiti"/>
-        <a:font script="Tibt" typeface="Microsoft Himalaya"/>
-        <a:font script="Thaa" typeface="MV Boli"/>
-        <a:font script="Deva" typeface="Mangal"/>
-        <a:font script="Telu" typeface="Gautami"/>
-        <a:font script="Taml" typeface="Latha"/>
-        <a:font script="Syrc" typeface="Estrangelo Edessa"/>
-        <a:font script="Orya" typeface="Kalinga"/>
-        <a:font script="Mlym" typeface="Kartika"/>
-        <a:font script="Laoo" typeface="DokChampa"/>
-        <a:font script="Sinh" typeface="Iskoola Pota"/>
-        <a:font script="Mong" typeface="Mongolian Baiti"/>
-        <a:font script="Viet" typeface="Times New Roman"/>
-        <a:font script="Uigh" typeface="Microsoft Uighur"/>
-        <a:font script="Geor" typeface="Sylfaen"/>
-      </a:majorFont>
-      <a:minorFont>
-        <a:latin typeface="Calibri"/>
-        <a:ea typeface=""/>
-        <a:cs typeface=""/>
-        <a:font script="Jpan" typeface="ＭＳ Ｐゴシック"/>
-        <a:font script="Hang" typeface="맑은 고딕"/>
-        <a:font script="Hans" typeface="宋体"/>
-        <a:font script="Hant" typeface="新細明體"/>
-        <a:font script="Arab" typeface="Arial"/>
-        <a:font script="Hebr" typeface="Arial"/>
-        <a:font script="Thai" typeface="Cordia New"/>
-        <a:font script="Ethi" typeface="Nyala"/>
-        <a:font script="Beng" typeface="Vrinda"/>
-        <a:font script="Gujr" typeface="Shruti"/>
-        <a:font script="Khmr" typeface="DaunPenh"/>
-        <a:font script="Knda" typeface="Tunga"/>
-        <a:font script="Guru" typeface="Raavi"/>
-        <a:font script="Cans" typeface="Euphemia"/>
-        <a:font script="Cher" typeface="Plantagenet Cherokee"/>
-        <a:font script="Yiii" typeface="Microsoft Yi Baiti"/>
-        <a:font script="Tibt" typeface="Microsoft Himalaya"/>
-        <a:font script="Thaa" typeface="MV Boli"/>
-        <a:font script="Deva" typeface="Mangal"/>
-        <a:font script="Telu" typeface="Gautami"/>
-        <a:font script="Taml" typeface="Latha"/>
-        <a:font script="Syrc" typeface="Estrangelo Edessa"/>
-        <a:font script="Orya" typeface="Kalinga"/>
-        <a:font script="Mlym" typeface="Kartika"/>
-        <a:font script="Laoo" typeface="DokChampa"/>
-        <a:font script="Sinh" typeface="Iskoola Pota"/>
-        <a:font script="Mong" typeface="Mongolian Baiti"/>
-        <a:font script="Viet" typeface="Arial"/>
-        <a:font script="Uigh" typeface="Microsoft Uighur"/>
-        <a:font script="Geor" typeface="Sylfaen"/>
-      </a:minorFont>
-    </a:fontScheme>
-    <a:fmtScheme name="Office">
-      <a:fillStyleLst>
-        <a:solidFill>
-          <a:schemeClr val="phClr"/>
-        </a:solidFill>
-        <a:gradFill rotWithShape="1">
-          <a:gsLst>
-            <a:gs pos="0">
-              <a:schemeClr val="phClr">
-                <a:tint val="50000"/>
-                <a:satMod val="300000"/>
-              </a:schemeClr>
-            </a:gs>
-            <a:gs pos="35000">
-              <a:schemeClr val="phClr">
-                <a:tint val="37000"/>
-                <a:satMod val="300000"/>
-              </a:schemeClr>
-            </a:gs>
-            <a:gs pos="100000">
-              <a:schemeClr val="phClr">
-                <a:tint val="15000"/>
-                <a:satMod val="350000"/>
-              </a:schemeClr>
-            </a:gs>
-          </a:gsLst>
-          <a:lin ang="16200000" scaled="1"/>
-        </a:gradFill>
-        <a:gradFill rotWithShape="1">
-          <a:gsLst>
-            <a:gs pos="0">
-              <a:schemeClr val="phClr">
-                <a:tint val="100000"/>
-                <a:shade val="100000"/>
-                <a:satMod val="130000"/>
-              </a:schemeClr>
-            </a:gs>
-            <a:gs pos="100000">
-              <a:schemeClr val="phClr">
-                <a:tint val="50000"/>
-                <a:shade val="100000"/>
-                <a:satMod val="350000"/>
-              </a:schemeClr>
-            </a:gs>
-          </a:gsLst>
-          <a:lin ang="16200000" scaled="0"/>
-        </a:gradFill>
-      </a:fillStyleLst>
-      <a:lnStyleLst>
-        <a:ln w="9525" cap="flat" cmpd="sng" algn="ctr">
-          <a:solidFill>
-            <a:schemeClr val="phClr">
-              <a:shade val="95000"/>
-              <a:satMod val="105000"/>
-            </a:schemeClr>
-          </a:solidFill>
-          <a:prstDash val="solid"/>
-        </a:ln>
-        <a:ln w="25400" cap="flat" cmpd="sng" algn="ctr">
-          <a:solidFill>
-            <a:schemeClr val="phClr"/>
-          </a:solidFill>
-          <a:prstDash val="solid"/>
-        </a:ln>
-        <a:ln w="38100" cap="flat" cmpd="sng" algn="ctr">
-          <a:solidFill>
-            <a:schemeClr val="phClr"/>
-          </a:solidFill>
-          <a:prstDash val="solid"/>
-        </a:ln>
-      </a:lnStyleLst>
-      <a:effectStyleLst>
-        <a:effectStyle>
-          <a:effectLst>
-            <a:outerShdw blurRad="40000" dist="20000" dir="5400000" rotWithShape="0">
-              <a:srgbClr val="000000">
-                <a:alpha val="38000"/>
-              </a:srgbClr>
-            </a:outerShdw>
-          </a:effectLst>
-        </a:effectStyle>
-        <a:effectStyle>
-          <a:effectLst>
-            <a:outerShdw blurRad="40000" dist="23000" dir="5400000" rotWithShape="0">
-              <a:srgbClr val="000000">
-                <a:alpha val="35000"/>
-              </a:srgbClr>
-            </a:outerShdw>
-          </a:effectLst>
-        </a:effectStyle>
-        <a:effectStyle>
-          <a:effectLst>
-            <a:outerShdw blurRad="40000" dist="23000" dir="5400000" rotWithShape="0">
-              <a:srgbClr val="000000">
-                <a:alpha val="35000"/>
-              </a:srgbClr>
-            </a:outerShdw>
-          </a:effectLst>
-          <a:scene3d>
-            <a:camera prst="orthographicFront">
-              <a:rot lat="0" lon="0" rev="0"/>
-            </a:camera>
-            <a:lightRig rig="threePt" dir="t">
-              <a:rot lat="0" lon="0" rev="1200000"/>
-            </a:lightRig>
-          </a:scene3d>
-          <a:sp3d>
-            <a:bevelT w="63500" h="25400"/>
-          </a:sp3d>
-        </a:effectStyle>
-      </a:effectStyleLst>
-      <a:bgFillStyleLst>
-        <a:solidFill>
-          <a:schemeClr val="phClr"/>
-        </a:solidFill>
-        <a:gradFill rotWithShape="1">
-          <a:gsLst>
-            <a:gs pos="0">
-              <a:schemeClr val="phClr">
-                <a:tint val="40000"/>
-                <a:satMod val="350000"/>
-              </a:schemeClr>
-            </a:gs>
-            <a:gs pos="40000">
-              <a:schemeClr val="phClr">
-                <a:tint val="45000"/>
-                <a:shade val="99000"/>
-                <a:satMod val="350000"/>
-              </a:schemeClr>
-            </a:gs>
-            <a:gs pos="100000">
-              <a:schemeClr val="phClr">
-                <a:shade val="20000"/>
-                <a:satMod val="255000"/>
-              </a:schemeClr>
-            </a:gs>
-          </a:gsLst>
-          <a:path path="circle">
-            <a:fillToRect l="50000" t="-80000" r="50000" b="180000"/>
-          </a:path>
-        </a:gradFill>
-        <a:gradFill rotWithShape="1">
-          <a:gsLst>
-            <a:gs pos="0">
-              <a:schemeClr val="phClr">
-                <a:tint val="80000"/>
-                <a:satMod val="300000"/>
-              </a:schemeClr>
-            </a:gs>
-            <a:gs pos="100000">
-              <a:schemeClr val="phClr">
-                <a:shade val="30000"/>
-                <a:satMod val="200000"/>
-              </a:schemeClr>
-            </a:gs>
-          </a:gsLst>
-          <a:path path="circle">
-            <a:fillToRect l="50000" t="50000" r="50000" b="50000"/>
-          </a:path>
-        </a:gradFill>
-      </a:bgFillStyleLst>
-    </a:fmtScheme>
-  </a:themeElements>
-  <a:objectDefaults>
-    <a:spDef>
-      <a:spPr/>
-      <a:bodyPr/>
-      <a:lstStyle/>
-      <a:style>
-        <a:lnRef idx="1">
-          <a:schemeClr val="accent1"/>
-        </a:lnRef>
-        <a:fillRef idx="3">
-          <a:schemeClr val="accent1"/>
-        </a:fillRef>
-        <a:effectRef idx="2">
-          <a:schemeClr val="accent1"/>
-        </a:effectRef>
-        <a:fontRef idx="minor">
-          <a:schemeClr val="lt1"/>
-        </a:fontRef>
-      </a:style>
-    </a:spDef>
-    <a:lnDef>
-      <a:spPr/>
-      <a:bodyPr/>
-      <a:lstStyle/>
-      <a:style>
-        <a:lnRef idx="2">
-          <a:schemeClr val="accent1"/>
-        </a:lnRef>
-        <a:fillRef idx="0">
-          <a:schemeClr val="accent1"/>
-        </a:fillRef>
-        <a:effectRef idx="1">
-          <a:schemeClr val="accent1"/>
-        </a:effectRef>
-        <a:fontRef idx="minor">
-          <a:schemeClr val="tx1"/>
-        </a:fontRef>
-      </a:style>
-    </a:lnDef>
-  </a:objectDefaults>
-  <a:extraClrSchemeLst/>
-</a:theme>
-</file>
-
-<file path=ppt/theme/theme2.xml><?xml version="1.0" encoding="utf-8"?>
 <a:theme xmlns:a="http://schemas.openxmlformats.org/drawingml/2006/main" name="Office Theme">
   <a:themeElements>
     <a:clrScheme name="Office">
@@ -5174,6 +5467,301 @@
   <a:extraClrSchemeLst/>
   <a:extLst>
     <a:ext uri="{05A4C25C-085E-4340-85A3-A5531E510DB2}">
+      <thm15:themeFamily xmlns:thm15="http://schemas.microsoft.com/office/thememl/2012/main" name="Winter 2023 NCEE Eggtimer Presentations.pptx" id="{A85DE4BE-61F0-4961-9ED5-4E6BA5606945}" vid="{DAB0B8BE-195F-4A65-8A54-60BEB16EA317}"/>
+    </a:ext>
+  </a:extLst>
+</a:theme>
+</file>
+
+<file path=ppt/theme/theme2.xml><?xml version="1.0" encoding="utf-8"?>
+<a:theme xmlns:a="http://schemas.openxmlformats.org/drawingml/2006/main" name="Office Theme">
+  <a:themeElements>
+    <a:clrScheme name="Office">
+      <a:dk1>
+        <a:sysClr val="windowText" lastClr="000000"/>
+      </a:dk1>
+      <a:lt1>
+        <a:sysClr val="window" lastClr="FFFFFF"/>
+      </a:lt1>
+      <a:dk2>
+        <a:srgbClr val="44546A"/>
+      </a:dk2>
+      <a:lt2>
+        <a:srgbClr val="E7E6E6"/>
+      </a:lt2>
+      <a:accent1>
+        <a:srgbClr val="4472C4"/>
+      </a:accent1>
+      <a:accent2>
+        <a:srgbClr val="ED7D31"/>
+      </a:accent2>
+      <a:accent3>
+        <a:srgbClr val="A5A5A5"/>
+      </a:accent3>
+      <a:accent4>
+        <a:srgbClr val="FFC000"/>
+      </a:accent4>
+      <a:accent5>
+        <a:srgbClr val="5B9BD5"/>
+      </a:accent5>
+      <a:accent6>
+        <a:srgbClr val="70AD47"/>
+      </a:accent6>
+      <a:hlink>
+        <a:srgbClr val="0563C1"/>
+      </a:hlink>
+      <a:folHlink>
+        <a:srgbClr val="954F72"/>
+      </a:folHlink>
+    </a:clrScheme>
+    <a:fontScheme name="Office">
+      <a:majorFont>
+        <a:latin typeface="Calibri Light" panose="020F0302020204030204"/>
+        <a:ea typeface=""/>
+        <a:cs typeface=""/>
+        <a:font script="Jpan" typeface="游ゴシック Light"/>
+        <a:font script="Hang" typeface="맑은 고딕"/>
+        <a:font script="Hans" typeface="等线 Light"/>
+        <a:font script="Hant" typeface="新細明體"/>
+        <a:font script="Arab" typeface="Times New Roman"/>
+        <a:font script="Hebr" typeface="Times New Roman"/>
+        <a:font script="Thai" typeface="Angsana New"/>
+        <a:font script="Ethi" typeface="Nyala"/>
+        <a:font script="Beng" typeface="Vrinda"/>
+        <a:font script="Gujr" typeface="Shruti"/>
+        <a:font script="Khmr" typeface="MoolBoran"/>
+        <a:font script="Knda" typeface="Tunga"/>
+        <a:font script="Guru" typeface="Raavi"/>
+        <a:font script="Cans" typeface="Euphemia"/>
+        <a:font script="Cher" typeface="Plantagenet Cherokee"/>
+        <a:font script="Yiii" typeface="Microsoft Yi Baiti"/>
+        <a:font script="Tibt" typeface="Microsoft Himalaya"/>
+        <a:font script="Thaa" typeface="MV Boli"/>
+        <a:font script="Deva" typeface="Mangal"/>
+        <a:font script="Telu" typeface="Gautami"/>
+        <a:font script="Taml" typeface="Latha"/>
+        <a:font script="Syrc" typeface="Estrangelo Edessa"/>
+        <a:font script="Orya" typeface="Kalinga"/>
+        <a:font script="Mlym" typeface="Kartika"/>
+        <a:font script="Laoo" typeface="DokChampa"/>
+        <a:font script="Sinh" typeface="Iskoola Pota"/>
+        <a:font script="Mong" typeface="Mongolian Baiti"/>
+        <a:font script="Viet" typeface="Times New Roman"/>
+        <a:font script="Uigh" typeface="Microsoft Uighur"/>
+        <a:font script="Geor" typeface="Sylfaen"/>
+        <a:font script="Armn" typeface="Arial"/>
+        <a:font script="Bugi" typeface="Leelawadee UI"/>
+        <a:font script="Bopo" typeface="Microsoft JhengHei"/>
+        <a:font script="Java" typeface="Javanese Text"/>
+        <a:font script="Lisu" typeface="Segoe UI"/>
+        <a:font script="Mymr" typeface="Myanmar Text"/>
+        <a:font script="Nkoo" typeface="Ebrima"/>
+        <a:font script="Olck" typeface="Nirmala UI"/>
+        <a:font script="Osma" typeface="Ebrima"/>
+        <a:font script="Phag" typeface="Phagspa"/>
+        <a:font script="Syrn" typeface="Estrangelo Edessa"/>
+        <a:font script="Syrj" typeface="Estrangelo Edessa"/>
+        <a:font script="Syre" typeface="Estrangelo Edessa"/>
+        <a:font script="Sora" typeface="Nirmala UI"/>
+        <a:font script="Tale" typeface="Microsoft Tai Le"/>
+        <a:font script="Talu" typeface="Microsoft New Tai Lue"/>
+        <a:font script="Tfng" typeface="Ebrima"/>
+      </a:majorFont>
+      <a:minorFont>
+        <a:latin typeface="Calibri" panose="020F0502020204030204"/>
+        <a:ea typeface=""/>
+        <a:cs typeface=""/>
+        <a:font script="Jpan" typeface="游ゴシック"/>
+        <a:font script="Hang" typeface="맑은 고딕"/>
+        <a:font script="Hans" typeface="等线"/>
+        <a:font script="Hant" typeface="新細明體"/>
+        <a:font script="Arab" typeface="Arial"/>
+        <a:font script="Hebr" typeface="Arial"/>
+        <a:font script="Thai" typeface="Cordia New"/>
+        <a:font script="Ethi" typeface="Nyala"/>
+        <a:font script="Beng" typeface="Vrinda"/>
+        <a:font script="Gujr" typeface="Shruti"/>
+        <a:font script="Khmr" typeface="DaunPenh"/>
+        <a:font script="Knda" typeface="Tunga"/>
+        <a:font script="Guru" typeface="Raavi"/>
+        <a:font script="Cans" typeface="Euphemia"/>
+        <a:font script="Cher" typeface="Plantagenet Cherokee"/>
+        <a:font script="Yiii" typeface="Microsoft Yi Baiti"/>
+        <a:font script="Tibt" typeface="Microsoft Himalaya"/>
+        <a:font script="Thaa" typeface="MV Boli"/>
+        <a:font script="Deva" typeface="Mangal"/>
+        <a:font script="Telu" typeface="Gautami"/>
+        <a:font script="Taml" typeface="Latha"/>
+        <a:font script="Syrc" typeface="Estrangelo Edessa"/>
+        <a:font script="Orya" typeface="Kalinga"/>
+        <a:font script="Mlym" typeface="Kartika"/>
+        <a:font script="Laoo" typeface="DokChampa"/>
+        <a:font script="Sinh" typeface="Iskoola Pota"/>
+        <a:font script="Mong" typeface="Mongolian Baiti"/>
+        <a:font script="Viet" typeface="Arial"/>
+        <a:font script="Uigh" typeface="Microsoft Uighur"/>
+        <a:font script="Geor" typeface="Sylfaen"/>
+        <a:font script="Armn" typeface="Arial"/>
+        <a:font script="Bugi" typeface="Leelawadee UI"/>
+        <a:font script="Bopo" typeface="Microsoft JhengHei"/>
+        <a:font script="Java" typeface="Javanese Text"/>
+        <a:font script="Lisu" typeface="Segoe UI"/>
+        <a:font script="Mymr" typeface="Myanmar Text"/>
+        <a:font script="Nkoo" typeface="Ebrima"/>
+        <a:font script="Olck" typeface="Nirmala UI"/>
+        <a:font script="Osma" typeface="Ebrima"/>
+        <a:font script="Phag" typeface="Phagspa"/>
+        <a:font script="Syrn" typeface="Estrangelo Edessa"/>
+        <a:font script="Syrj" typeface="Estrangelo Edessa"/>
+        <a:font script="Syre" typeface="Estrangelo Edessa"/>
+        <a:font script="Sora" typeface="Nirmala UI"/>
+        <a:font script="Tale" typeface="Microsoft Tai Le"/>
+        <a:font script="Talu" typeface="Microsoft New Tai Lue"/>
+        <a:font script="Tfng" typeface="Ebrima"/>
+      </a:minorFont>
+    </a:fontScheme>
+    <a:fmtScheme name="Office">
+      <a:fillStyleLst>
+        <a:solidFill>
+          <a:schemeClr val="phClr"/>
+        </a:solidFill>
+        <a:gradFill rotWithShape="1">
+          <a:gsLst>
+            <a:gs pos="0">
+              <a:schemeClr val="phClr">
+                <a:lumMod val="110000"/>
+                <a:satMod val="105000"/>
+                <a:tint val="67000"/>
+              </a:schemeClr>
+            </a:gs>
+            <a:gs pos="50000">
+              <a:schemeClr val="phClr">
+                <a:lumMod val="105000"/>
+                <a:satMod val="103000"/>
+                <a:tint val="73000"/>
+              </a:schemeClr>
+            </a:gs>
+            <a:gs pos="100000">
+              <a:schemeClr val="phClr">
+                <a:lumMod val="105000"/>
+                <a:satMod val="109000"/>
+                <a:tint val="81000"/>
+              </a:schemeClr>
+            </a:gs>
+          </a:gsLst>
+          <a:lin ang="5400000" scaled="0"/>
+        </a:gradFill>
+        <a:gradFill rotWithShape="1">
+          <a:gsLst>
+            <a:gs pos="0">
+              <a:schemeClr val="phClr">
+                <a:satMod val="103000"/>
+                <a:lumMod val="102000"/>
+                <a:tint val="94000"/>
+              </a:schemeClr>
+            </a:gs>
+            <a:gs pos="50000">
+              <a:schemeClr val="phClr">
+                <a:satMod val="110000"/>
+                <a:lumMod val="100000"/>
+                <a:shade val="100000"/>
+              </a:schemeClr>
+            </a:gs>
+            <a:gs pos="100000">
+              <a:schemeClr val="phClr">
+                <a:lumMod val="99000"/>
+                <a:satMod val="120000"/>
+                <a:shade val="78000"/>
+              </a:schemeClr>
+            </a:gs>
+          </a:gsLst>
+          <a:lin ang="5400000" scaled="0"/>
+        </a:gradFill>
+      </a:fillStyleLst>
+      <a:lnStyleLst>
+        <a:ln w="6350" cap="flat" cmpd="sng" algn="ctr">
+          <a:solidFill>
+            <a:schemeClr val="phClr"/>
+          </a:solidFill>
+          <a:prstDash val="solid"/>
+          <a:miter lim="800000"/>
+        </a:ln>
+        <a:ln w="12700" cap="flat" cmpd="sng" algn="ctr">
+          <a:solidFill>
+            <a:schemeClr val="phClr"/>
+          </a:solidFill>
+          <a:prstDash val="solid"/>
+          <a:miter lim="800000"/>
+        </a:ln>
+        <a:ln w="19050" cap="flat" cmpd="sng" algn="ctr">
+          <a:solidFill>
+            <a:schemeClr val="phClr"/>
+          </a:solidFill>
+          <a:prstDash val="solid"/>
+          <a:miter lim="800000"/>
+        </a:ln>
+      </a:lnStyleLst>
+      <a:effectStyleLst>
+        <a:effectStyle>
+          <a:effectLst/>
+        </a:effectStyle>
+        <a:effectStyle>
+          <a:effectLst/>
+        </a:effectStyle>
+        <a:effectStyle>
+          <a:effectLst>
+            <a:outerShdw blurRad="57150" dist="19050" dir="5400000" algn="ctr" rotWithShape="0">
+              <a:srgbClr val="000000">
+                <a:alpha val="63000"/>
+              </a:srgbClr>
+            </a:outerShdw>
+          </a:effectLst>
+        </a:effectStyle>
+      </a:effectStyleLst>
+      <a:bgFillStyleLst>
+        <a:solidFill>
+          <a:schemeClr val="phClr"/>
+        </a:solidFill>
+        <a:solidFill>
+          <a:schemeClr val="phClr">
+            <a:tint val="95000"/>
+            <a:satMod val="170000"/>
+          </a:schemeClr>
+        </a:solidFill>
+        <a:gradFill rotWithShape="1">
+          <a:gsLst>
+            <a:gs pos="0">
+              <a:schemeClr val="phClr">
+                <a:tint val="93000"/>
+                <a:satMod val="150000"/>
+                <a:shade val="98000"/>
+                <a:lumMod val="102000"/>
+              </a:schemeClr>
+            </a:gs>
+            <a:gs pos="50000">
+              <a:schemeClr val="phClr">
+                <a:tint val="98000"/>
+                <a:satMod val="130000"/>
+                <a:shade val="90000"/>
+                <a:lumMod val="103000"/>
+              </a:schemeClr>
+            </a:gs>
+            <a:gs pos="100000">
+              <a:schemeClr val="phClr">
+                <a:shade val="63000"/>
+                <a:satMod val="120000"/>
+              </a:schemeClr>
+            </a:gs>
+          </a:gsLst>
+          <a:lin ang="5400000" scaled="0"/>
+        </a:gradFill>
+      </a:bgFillStyleLst>
+    </a:fmtScheme>
+  </a:themeElements>
+  <a:objectDefaults/>
+  <a:extraClrSchemeLst/>
+  <a:extLst>
+    <a:ext uri="{05A4C25C-085E-4340-85A3-A5531E510DB2}">
       <thm15:themeFamily xmlns:thm15="http://schemas.microsoft.com/office/thememl/2012/main" name="Office Theme" id="{62F939B6-93AF-4DB8-9C6B-D6C7DFDC589F}" vid="{4A3C46E8-61CC-4603-A589-7422A47A8E4A}"/>
     </a:ext>
   </a:extLst>

</xml_diff>